<commit_message>
changed the index completely
</commit_message>
<xml_diff>
--- a/docs/RL/RL1_slides.pptx
+++ b/docs/RL/RL1_slides.pptx
@@ -5,7 +5,7 @@
     <p:sldMasterId id="2147483648" r:id="rId1"/>
   </p:sldMasterIdLst>
   <p:notesMasterIdLst>
-    <p:notesMasterId r:id="rId11"/>
+    <p:notesMasterId r:id="rId34"/>
   </p:notesMasterIdLst>
   <p:sldIdLst>
     <p:sldId id="256" r:id="rId2"/>
@@ -15,8 +15,31 @@
     <p:sldId id="257" r:id="rId6"/>
     <p:sldId id="258" r:id="rId7"/>
     <p:sldId id="262" r:id="rId8"/>
-    <p:sldId id="263" r:id="rId9"/>
-    <p:sldId id="264" r:id="rId10"/>
+    <p:sldId id="266" r:id="rId9"/>
+    <p:sldId id="263" r:id="rId10"/>
+    <p:sldId id="267" r:id="rId11"/>
+    <p:sldId id="264" r:id="rId12"/>
+    <p:sldId id="265" r:id="rId13"/>
+    <p:sldId id="268" r:id="rId14"/>
+    <p:sldId id="269" r:id="rId15"/>
+    <p:sldId id="270" r:id="rId16"/>
+    <p:sldId id="271" r:id="rId17"/>
+    <p:sldId id="272" r:id="rId18"/>
+    <p:sldId id="273" r:id="rId19"/>
+    <p:sldId id="285" r:id="rId20"/>
+    <p:sldId id="274" r:id="rId21"/>
+    <p:sldId id="275" r:id="rId22"/>
+    <p:sldId id="278" r:id="rId23"/>
+    <p:sldId id="279" r:id="rId24"/>
+    <p:sldId id="276" r:id="rId25"/>
+    <p:sldId id="277" r:id="rId26"/>
+    <p:sldId id="280" r:id="rId27"/>
+    <p:sldId id="281" r:id="rId28"/>
+    <p:sldId id="282" r:id="rId29"/>
+    <p:sldId id="283" r:id="rId30"/>
+    <p:sldId id="284" r:id="rId31"/>
+    <p:sldId id="286" r:id="rId32"/>
+    <p:sldId id="287" r:id="rId33"/>
   </p:sldIdLst>
   <p:sldSz cx="12192000" cy="6858000"/>
   <p:notesSz cx="6858000" cy="9144000"/>
@@ -205,7 +228,7 @@
           <a:p>
             <a:fld id="{20A35D05-0FFE-7241-8951-E91C685F1BC9}" type="datetimeFigureOut">
               <a:rPr lang="en-US" smtClean="0"/>
-              <a:t>11/20/23</a:t>
+              <a:t>11/27/23</a:t>
             </a:fld>
             <a:endParaRPr lang="en-US"/>
           </a:p>
@@ -472,6 +495,90 @@
 </p:notesMaster>
 </file>
 
+<file path=ppt/notesSlides/notesSlide1.xml><?xml version="1.0" encoding="utf-8"?>
+<p:notes xmlns:a="http://schemas.openxmlformats.org/drawingml/2006/main" xmlns:r="http://schemas.openxmlformats.org/officeDocument/2006/relationships" xmlns:p="http://schemas.openxmlformats.org/presentationml/2006/main">
+  <p:cSld>
+    <p:spTree>
+      <p:nvGrpSpPr>
+        <p:cNvPr id="1" name=""/>
+        <p:cNvGrpSpPr/>
+        <p:nvPr/>
+      </p:nvGrpSpPr>
+      <p:grpSpPr>
+        <a:xfrm>
+          <a:off x="0" y="0"/>
+          <a:ext cx="0" cy="0"/>
+          <a:chOff x="0" y="0"/>
+          <a:chExt cx="0" cy="0"/>
+        </a:xfrm>
+      </p:grpSpPr>
+      <p:sp>
+        <p:nvSpPr>
+          <p:cNvPr id="2" name="Slide Image Placeholder 1"/>
+          <p:cNvSpPr>
+            <a:spLocks noGrp="1" noRot="1" noChangeAspect="1"/>
+          </p:cNvSpPr>
+          <p:nvPr>
+            <p:ph type="sldImg"/>
+          </p:nvPr>
+        </p:nvSpPr>
+        <p:spPr/>
+      </p:sp>
+      <p:sp>
+        <p:nvSpPr>
+          <p:cNvPr id="3" name="Notes Placeholder 2"/>
+          <p:cNvSpPr>
+            <a:spLocks noGrp="1"/>
+          </p:cNvSpPr>
+          <p:nvPr>
+            <p:ph type="body" idx="1"/>
+          </p:nvPr>
+        </p:nvSpPr>
+        <p:spPr/>
+        <p:txBody>
+          <a:bodyPr/>
+          <a:lstStyle/>
+          <a:p>
+            <a:endParaRPr lang="en-US"/>
+          </a:p>
+        </p:txBody>
+      </p:sp>
+      <p:sp>
+        <p:nvSpPr>
+          <p:cNvPr id="4" name="Slide Number Placeholder 3"/>
+          <p:cNvSpPr>
+            <a:spLocks noGrp="1"/>
+          </p:cNvSpPr>
+          <p:nvPr>
+            <p:ph type="sldNum" sz="quarter" idx="5"/>
+          </p:nvPr>
+        </p:nvSpPr>
+        <p:spPr/>
+        <p:txBody>
+          <a:bodyPr/>
+          <a:lstStyle/>
+          <a:p>
+            <a:fld id="{CB50E080-5BA6-AE44-AB42-011C095C5EBE}" type="slidenum">
+              <a:rPr lang="en-US" smtClean="0"/>
+              <a:t>12</a:t>
+            </a:fld>
+            <a:endParaRPr lang="en-US"/>
+          </a:p>
+        </p:txBody>
+      </p:sp>
+    </p:spTree>
+    <p:extLst>
+      <p:ext uri="{BB962C8B-B14F-4D97-AF65-F5344CB8AC3E}">
+        <p14:creationId xmlns:p14="http://schemas.microsoft.com/office/powerpoint/2010/main" val="1505585783"/>
+      </p:ext>
+    </p:extLst>
+  </p:cSld>
+  <p:clrMapOvr>
+    <a:masterClrMapping/>
+  </p:clrMapOvr>
+</p:notes>
+</file>
+
 <file path=ppt/slideLayouts/slideLayout1.xml><?xml version="1.0" encoding="utf-8"?>
 <p:sldLayout xmlns:a="http://schemas.openxmlformats.org/drawingml/2006/main" xmlns:r="http://schemas.openxmlformats.org/officeDocument/2006/relationships" xmlns:p="http://schemas.openxmlformats.org/presentationml/2006/main" type="title" preserve="1">
   <p:cSld name="Title Slide">
@@ -619,7 +726,7 @@
           <a:p>
             <a:fld id="{A1AB1AA4-94EF-FF48-93D4-0AD3CDECFFFF}" type="datetime1">
               <a:rPr lang="en-CA" smtClean="0"/>
-              <a:t>2023-11-20</a:t>
+              <a:t>2023-11-27</a:t>
             </a:fld>
             <a:endParaRPr lang="en-US"/>
           </a:p>
@@ -820,7 +927,7 @@
           <a:p>
             <a:fld id="{FF5F036D-AF89-8C43-804A-D3BDAC9A1719}" type="datetime1">
               <a:rPr lang="en-CA" smtClean="0"/>
-              <a:t>2023-11-20</a:t>
+              <a:t>2023-11-27</a:t>
             </a:fld>
             <a:endParaRPr lang="en-US"/>
           </a:p>
@@ -1031,7 +1138,7 @@
           <a:p>
             <a:fld id="{5B957A9F-9447-FD4A-807A-AA3FFC37BE3C}" type="datetime1">
               <a:rPr lang="en-CA" smtClean="0"/>
-              <a:t>2023-11-20</a:t>
+              <a:t>2023-11-27</a:t>
             </a:fld>
             <a:endParaRPr lang="en-US"/>
           </a:p>
@@ -1232,7 +1339,7 @@
           <a:p>
             <a:fld id="{2131C477-4C2E-A04E-BE29-A7A05C4CBAF0}" type="datetime1">
               <a:rPr lang="en-CA" smtClean="0"/>
-              <a:t>2023-11-20</a:t>
+              <a:t>2023-11-27</a:t>
             </a:fld>
             <a:endParaRPr lang="en-US"/>
           </a:p>
@@ -1510,7 +1617,7 @@
           <a:p>
             <a:fld id="{D795D2B6-EF62-A145-AB28-C2C88E1486E1}" type="datetime1">
               <a:rPr lang="en-CA" smtClean="0"/>
-              <a:t>2023-11-20</a:t>
+              <a:t>2023-11-27</a:t>
             </a:fld>
             <a:endParaRPr lang="en-US"/>
           </a:p>
@@ -1778,7 +1885,7 @@
           <a:p>
             <a:fld id="{275F8B6D-B43A-9F47-853C-CE150EA8D49D}" type="datetime1">
               <a:rPr lang="en-CA" smtClean="0"/>
-              <a:t>2023-11-20</a:t>
+              <a:t>2023-11-27</a:t>
             </a:fld>
             <a:endParaRPr lang="en-US"/>
           </a:p>
@@ -2193,7 +2300,7 @@
           <a:p>
             <a:fld id="{01A9CB5E-3754-2A44-9373-47DB8933751C}" type="datetime1">
               <a:rPr lang="en-CA" smtClean="0"/>
-              <a:t>2023-11-20</a:t>
+              <a:t>2023-11-27</a:t>
             </a:fld>
             <a:endParaRPr lang="en-US"/>
           </a:p>
@@ -2337,7 +2444,7 @@
           <a:p>
             <a:fld id="{8A58FEC7-ACEF-BE48-B757-75BD769B57AD}" type="datetime1">
               <a:rPr lang="en-CA" smtClean="0"/>
-              <a:t>2023-11-20</a:t>
+              <a:t>2023-11-27</a:t>
             </a:fld>
             <a:endParaRPr lang="en-US"/>
           </a:p>
@@ -2453,7 +2560,7 @@
           <a:p>
             <a:fld id="{47996B3E-ADA4-E04C-8D80-F20A85129336}" type="datetime1">
               <a:rPr lang="en-CA" smtClean="0"/>
-              <a:t>2023-11-20</a:t>
+              <a:t>2023-11-27</a:t>
             </a:fld>
             <a:endParaRPr lang="en-US"/>
           </a:p>
@@ -2767,7 +2874,7 @@
           <a:p>
             <a:fld id="{29B21ED2-6D5E-D34F-9A9B-56E5AB55CB97}" type="datetime1">
               <a:rPr lang="en-CA" smtClean="0"/>
-              <a:t>2023-11-20</a:t>
+              <a:t>2023-11-27</a:t>
             </a:fld>
             <a:endParaRPr lang="en-US"/>
           </a:p>
@@ -3058,7 +3165,7 @@
           <a:p>
             <a:fld id="{EC09FDD5-C27C-2046-AFA1-4B0BA9883D19}" type="datetime1">
               <a:rPr lang="en-CA" smtClean="0"/>
-              <a:t>2023-11-20</a:t>
+              <a:t>2023-11-27</a:t>
             </a:fld>
             <a:endParaRPr lang="en-US"/>
           </a:p>
@@ -3302,7 +3409,7 @@
           <a:p>
             <a:fld id="{1F1957F8-E82E-E04A-AE89-E76546C82BA1}" type="datetime1">
               <a:rPr lang="en-CA" smtClean="0"/>
-              <a:t>2023-11-20</a:t>
+              <a:t>2023-11-27</a:t>
             </a:fld>
             <a:endParaRPr lang="en-US"/>
           </a:p>
@@ -3933,6 +4040,2030 @@
     <p:extLst>
       <p:ext uri="{BB962C8B-B14F-4D97-AF65-F5344CB8AC3E}">
         <p14:creationId xmlns:p14="http://schemas.microsoft.com/office/powerpoint/2010/main" val="1914250356"/>
+      </p:ext>
+    </p:extLst>
+  </p:cSld>
+  <p:clrMapOvr>
+    <a:masterClrMapping/>
+  </p:clrMapOvr>
+</p:sld>
+</file>
+
+<file path=ppt/slides/slide10.xml><?xml version="1.0" encoding="utf-8"?>
+<p:sld xmlns:a="http://schemas.openxmlformats.org/drawingml/2006/main" xmlns:r="http://schemas.openxmlformats.org/officeDocument/2006/relationships" xmlns:p="http://schemas.openxmlformats.org/presentationml/2006/main">
+  <p:cSld>
+    <p:spTree>
+      <p:nvGrpSpPr>
+        <p:cNvPr id="1" name=""/>
+        <p:cNvGrpSpPr/>
+        <p:nvPr/>
+      </p:nvGrpSpPr>
+      <p:grpSpPr>
+        <a:xfrm>
+          <a:off x="0" y="0"/>
+          <a:ext cx="0" cy="0"/>
+          <a:chOff x="0" y="0"/>
+          <a:chExt cx="0" cy="0"/>
+        </a:xfrm>
+      </p:grpSpPr>
+      <p:sp>
+        <p:nvSpPr>
+          <p:cNvPr id="2" name="Title 1">
+            <a:extLst>
+              <a:ext uri="{FF2B5EF4-FFF2-40B4-BE49-F238E27FC236}">
+                <a16:creationId xmlns:a16="http://schemas.microsoft.com/office/drawing/2014/main" id="{694CEC3E-E94D-A46F-39D1-A526C29D0445}"/>
+              </a:ext>
+            </a:extLst>
+          </p:cNvPr>
+          <p:cNvSpPr>
+            <a:spLocks noGrp="1"/>
+          </p:cNvSpPr>
+          <p:nvPr>
+            <p:ph type="title"/>
+          </p:nvPr>
+        </p:nvSpPr>
+        <p:spPr/>
+        <p:txBody>
+          <a:bodyPr/>
+          <a:lstStyle/>
+          <a:p>
+            <a:r>
+              <a:rPr lang="en-US" dirty="0"/>
+              <a:t>Value Function</a:t>
+            </a:r>
+          </a:p>
+        </p:txBody>
+      </p:sp>
+      <p:sp>
+        <p:nvSpPr>
+          <p:cNvPr id="3" name="Content Placeholder 2">
+            <a:extLst>
+              <a:ext uri="{FF2B5EF4-FFF2-40B4-BE49-F238E27FC236}">
+                <a16:creationId xmlns:a16="http://schemas.microsoft.com/office/drawing/2014/main" id="{D5230B5F-98CB-7747-6077-1D4E5C6166F4}"/>
+              </a:ext>
+            </a:extLst>
+          </p:cNvPr>
+          <p:cNvSpPr>
+            <a:spLocks noGrp="1"/>
+          </p:cNvSpPr>
+          <p:nvPr>
+            <p:ph idx="1"/>
+          </p:nvPr>
+        </p:nvSpPr>
+        <p:spPr/>
+        <p:txBody>
+          <a:bodyPr/>
+          <a:lstStyle/>
+          <a:p>
+            <a:r>
+              <a:rPr lang="en-US" dirty="0"/>
+              <a:t>Turning immediate rewards (r) into long-term utilities (v)</a:t>
+            </a:r>
+          </a:p>
+          <a:p>
+            <a:r>
+              <a:rPr lang="en-US" dirty="0"/>
+              <a:t>Then we can maximize </a:t>
+            </a:r>
+            <a:r>
+              <a:rPr lang="en-US" b="1" dirty="0"/>
+              <a:t>only</a:t>
+            </a:r>
+            <a:r>
+              <a:rPr lang="en-US" dirty="0"/>
+              <a:t> the utility of the next state.</a:t>
+            </a:r>
+          </a:p>
+        </p:txBody>
+      </p:sp>
+      <p:sp>
+        <p:nvSpPr>
+          <p:cNvPr id="4" name="Footer Placeholder 3">
+            <a:extLst>
+              <a:ext uri="{FF2B5EF4-FFF2-40B4-BE49-F238E27FC236}">
+                <a16:creationId xmlns:a16="http://schemas.microsoft.com/office/drawing/2014/main" id="{8A7285C6-30A1-84F3-F0F2-19A21D6FA698}"/>
+              </a:ext>
+            </a:extLst>
+          </p:cNvPr>
+          <p:cNvSpPr>
+            <a:spLocks noGrp="1"/>
+          </p:cNvSpPr>
+          <p:nvPr>
+            <p:ph type="ftr" sz="quarter" idx="11"/>
+          </p:nvPr>
+        </p:nvSpPr>
+        <p:spPr/>
+        <p:txBody>
+          <a:bodyPr/>
+          <a:lstStyle/>
+          <a:p>
+            <a:r>
+              <a:rPr lang="en-US"/>
+              <a:t>Davood Wadi</a:t>
+            </a:r>
+          </a:p>
+        </p:txBody>
+      </p:sp>
+      <p:sp>
+        <p:nvSpPr>
+          <p:cNvPr id="5" name="Slide Number Placeholder 4">
+            <a:extLst>
+              <a:ext uri="{FF2B5EF4-FFF2-40B4-BE49-F238E27FC236}">
+                <a16:creationId xmlns:a16="http://schemas.microsoft.com/office/drawing/2014/main" id="{07D4717A-AC18-830B-BA89-91E00BB58B3A}"/>
+              </a:ext>
+            </a:extLst>
+          </p:cNvPr>
+          <p:cNvSpPr>
+            <a:spLocks noGrp="1"/>
+          </p:cNvSpPr>
+          <p:nvPr>
+            <p:ph type="sldNum" sz="quarter" idx="12"/>
+          </p:nvPr>
+        </p:nvSpPr>
+        <p:spPr/>
+        <p:txBody>
+          <a:bodyPr/>
+          <a:lstStyle/>
+          <a:p>
+            <a:fld id="{3675ED69-EEF9-2244-A839-9AD338E45078}" type="slidenum">
+              <a:rPr lang="en-US" smtClean="0"/>
+              <a:t>10</a:t>
+            </a:fld>
+            <a:endParaRPr lang="en-US"/>
+          </a:p>
+        </p:txBody>
+      </p:sp>
+    </p:spTree>
+    <p:extLst>
+      <p:ext uri="{BB962C8B-B14F-4D97-AF65-F5344CB8AC3E}">
+        <p14:creationId xmlns:p14="http://schemas.microsoft.com/office/powerpoint/2010/main" val="1698533927"/>
+      </p:ext>
+    </p:extLst>
+  </p:cSld>
+  <p:clrMapOvr>
+    <a:masterClrMapping/>
+  </p:clrMapOvr>
+</p:sld>
+</file>
+
+<file path=ppt/slides/slide11.xml><?xml version="1.0" encoding="utf-8"?>
+<p:sld xmlns:a="http://schemas.openxmlformats.org/drawingml/2006/main" xmlns:r="http://schemas.openxmlformats.org/officeDocument/2006/relationships" xmlns:p="http://schemas.openxmlformats.org/presentationml/2006/main">
+  <p:cSld>
+    <p:spTree>
+      <p:nvGrpSpPr>
+        <p:cNvPr id="1" name=""/>
+        <p:cNvGrpSpPr/>
+        <p:nvPr/>
+      </p:nvGrpSpPr>
+      <p:grpSpPr>
+        <a:xfrm>
+          <a:off x="0" y="0"/>
+          <a:ext cx="0" cy="0"/>
+          <a:chOff x="0" y="0"/>
+          <a:chExt cx="0" cy="0"/>
+        </a:xfrm>
+      </p:grpSpPr>
+      <p:sp>
+        <p:nvSpPr>
+          <p:cNvPr id="2" name="Title 1">
+            <a:extLst>
+              <a:ext uri="{FF2B5EF4-FFF2-40B4-BE49-F238E27FC236}">
+                <a16:creationId xmlns:a16="http://schemas.microsoft.com/office/drawing/2014/main" id="{16ED25C1-58FD-9FAC-FB8B-2201295BFFEA}"/>
+              </a:ext>
+            </a:extLst>
+          </p:cNvPr>
+          <p:cNvSpPr>
+            <a:spLocks noGrp="1"/>
+          </p:cNvSpPr>
+          <p:nvPr>
+            <p:ph type="title"/>
+          </p:nvPr>
+        </p:nvSpPr>
+        <p:spPr/>
+        <p:txBody>
+          <a:bodyPr/>
+          <a:lstStyle/>
+          <a:p>
+            <a:r>
+              <a:rPr lang="en-US" dirty="0"/>
+              <a:t>MDP example</a:t>
+            </a:r>
+          </a:p>
+        </p:txBody>
+      </p:sp>
+      <p:sp>
+        <p:nvSpPr>
+          <p:cNvPr id="3" name="Content Placeholder 2">
+            <a:extLst>
+              <a:ext uri="{FF2B5EF4-FFF2-40B4-BE49-F238E27FC236}">
+                <a16:creationId xmlns:a16="http://schemas.microsoft.com/office/drawing/2014/main" id="{561CF887-221C-F604-4515-1A717E23FC62}"/>
+              </a:ext>
+            </a:extLst>
+          </p:cNvPr>
+          <p:cNvSpPr>
+            <a:spLocks noGrp="1"/>
+          </p:cNvSpPr>
+          <p:nvPr>
+            <p:ph idx="1"/>
+          </p:nvPr>
+        </p:nvSpPr>
+        <p:spPr/>
+        <p:txBody>
+          <a:bodyPr/>
+          <a:lstStyle/>
+          <a:p>
+            <a:r>
+              <a:rPr lang="en-US" dirty="0"/>
+              <a:t>Chess</a:t>
+            </a:r>
+          </a:p>
+          <a:p>
+            <a:r>
+              <a:rPr lang="en-US" dirty="0"/>
+              <a:t>Playing video games</a:t>
+            </a:r>
+          </a:p>
+          <a:p>
+            <a:r>
+              <a:rPr lang="en-US" dirty="0"/>
+              <a:t>Trading financial instruments</a:t>
+            </a:r>
+          </a:p>
+          <a:p>
+            <a:r>
+              <a:rPr lang="en-US" dirty="0"/>
+              <a:t>Driving</a:t>
+            </a:r>
+          </a:p>
+        </p:txBody>
+      </p:sp>
+      <p:sp>
+        <p:nvSpPr>
+          <p:cNvPr id="4" name="Footer Placeholder 3">
+            <a:extLst>
+              <a:ext uri="{FF2B5EF4-FFF2-40B4-BE49-F238E27FC236}">
+                <a16:creationId xmlns:a16="http://schemas.microsoft.com/office/drawing/2014/main" id="{F281C627-52A0-1F38-B948-C53BAD9D9E42}"/>
+              </a:ext>
+            </a:extLst>
+          </p:cNvPr>
+          <p:cNvSpPr>
+            <a:spLocks noGrp="1"/>
+          </p:cNvSpPr>
+          <p:nvPr>
+            <p:ph type="ftr" sz="quarter" idx="11"/>
+          </p:nvPr>
+        </p:nvSpPr>
+        <p:spPr/>
+        <p:txBody>
+          <a:bodyPr/>
+          <a:lstStyle/>
+          <a:p>
+            <a:r>
+              <a:rPr lang="en-US"/>
+              <a:t>Davood Wadi</a:t>
+            </a:r>
+          </a:p>
+        </p:txBody>
+      </p:sp>
+      <p:sp>
+        <p:nvSpPr>
+          <p:cNvPr id="5" name="Slide Number Placeholder 4">
+            <a:extLst>
+              <a:ext uri="{FF2B5EF4-FFF2-40B4-BE49-F238E27FC236}">
+                <a16:creationId xmlns:a16="http://schemas.microsoft.com/office/drawing/2014/main" id="{D2DBC3A1-0BA1-074E-C31D-AF9C0445E7AB}"/>
+              </a:ext>
+            </a:extLst>
+          </p:cNvPr>
+          <p:cNvSpPr>
+            <a:spLocks noGrp="1"/>
+          </p:cNvSpPr>
+          <p:nvPr>
+            <p:ph type="sldNum" sz="quarter" idx="12"/>
+          </p:nvPr>
+        </p:nvSpPr>
+        <p:spPr/>
+        <p:txBody>
+          <a:bodyPr/>
+          <a:lstStyle/>
+          <a:p>
+            <a:fld id="{3675ED69-EEF9-2244-A839-9AD338E45078}" type="slidenum">
+              <a:rPr lang="en-US" smtClean="0"/>
+              <a:t>11</a:t>
+            </a:fld>
+            <a:endParaRPr lang="en-US"/>
+          </a:p>
+        </p:txBody>
+      </p:sp>
+    </p:spTree>
+    <p:extLst>
+      <p:ext uri="{BB962C8B-B14F-4D97-AF65-F5344CB8AC3E}">
+        <p14:creationId xmlns:p14="http://schemas.microsoft.com/office/powerpoint/2010/main" val="948981311"/>
+      </p:ext>
+    </p:extLst>
+  </p:cSld>
+  <p:clrMapOvr>
+    <a:masterClrMapping/>
+  </p:clrMapOvr>
+</p:sld>
+</file>
+
+<file path=ppt/slides/slide12.xml><?xml version="1.0" encoding="utf-8"?>
+<p:sld xmlns:a="http://schemas.openxmlformats.org/drawingml/2006/main" xmlns:r="http://schemas.openxmlformats.org/officeDocument/2006/relationships" xmlns:p="http://schemas.openxmlformats.org/presentationml/2006/main">
+  <p:cSld>
+    <p:spTree>
+      <p:nvGrpSpPr>
+        <p:cNvPr id="1" name=""/>
+        <p:cNvGrpSpPr/>
+        <p:nvPr/>
+      </p:nvGrpSpPr>
+      <p:grpSpPr>
+        <a:xfrm>
+          <a:off x="0" y="0"/>
+          <a:ext cx="0" cy="0"/>
+          <a:chOff x="0" y="0"/>
+          <a:chExt cx="0" cy="0"/>
+        </a:xfrm>
+      </p:grpSpPr>
+      <p:sp>
+        <p:nvSpPr>
+          <p:cNvPr id="2" name="Title 1">
+            <a:extLst>
+              <a:ext uri="{FF2B5EF4-FFF2-40B4-BE49-F238E27FC236}">
+                <a16:creationId xmlns:a16="http://schemas.microsoft.com/office/drawing/2014/main" id="{D6C5C52A-114B-C5DB-0562-BFC91F3AB18F}"/>
+              </a:ext>
+            </a:extLst>
+          </p:cNvPr>
+          <p:cNvSpPr>
+            <a:spLocks noGrp="1"/>
+          </p:cNvSpPr>
+          <p:nvPr>
+            <p:ph type="title"/>
+          </p:nvPr>
+        </p:nvSpPr>
+        <p:spPr/>
+        <p:txBody>
+          <a:bodyPr/>
+          <a:lstStyle/>
+          <a:p>
+            <a:r>
+              <a:rPr lang="en-US" dirty="0"/>
+              <a:t>Recycling Robot</a:t>
+            </a:r>
+          </a:p>
+        </p:txBody>
+      </p:sp>
+      <p:pic>
+        <p:nvPicPr>
+          <p:cNvPr id="6" name="Content Placeholder 5">
+            <a:extLst>
+              <a:ext uri="{FF2B5EF4-FFF2-40B4-BE49-F238E27FC236}">
+                <a16:creationId xmlns:a16="http://schemas.microsoft.com/office/drawing/2014/main" id="{58671194-721C-D499-CA7F-52FDD25E71BE}"/>
+              </a:ext>
+            </a:extLst>
+          </p:cNvPr>
+          <p:cNvPicPr>
+            <a:picLocks noGrp="1" noChangeAspect="1"/>
+          </p:cNvPicPr>
+          <p:nvPr>
+            <p:ph sz="half" idx="1"/>
+          </p:nvPr>
+        </p:nvPicPr>
+        <p:blipFill>
+          <a:blip r:embed="rId3"/>
+          <a:stretch>
+            <a:fillRect/>
+          </a:stretch>
+        </p:blipFill>
+        <p:spPr>
+          <a:xfrm>
+            <a:off x="838200" y="3233650"/>
+            <a:ext cx="5181600" cy="1535288"/>
+          </a:xfrm>
+          <a:prstGeom prst="rect">
+            <a:avLst/>
+          </a:prstGeom>
+        </p:spPr>
+      </p:pic>
+      <mc:AlternateContent xmlns:mc="http://schemas.openxmlformats.org/markup-compatibility/2006" xmlns:a14="http://schemas.microsoft.com/office/drawing/2010/main">
+        <mc:Choice Requires="a14">
+          <p:sp>
+            <p:nvSpPr>
+              <p:cNvPr id="7" name="Content Placeholder 6">
+                <a:extLst>
+                  <a:ext uri="{FF2B5EF4-FFF2-40B4-BE49-F238E27FC236}">
+                    <a16:creationId xmlns:a16="http://schemas.microsoft.com/office/drawing/2014/main" id="{D3B02991-BB3D-06BD-6B6A-1E6063964F04}"/>
+                  </a:ext>
+                </a:extLst>
+              </p:cNvPr>
+              <p:cNvSpPr>
+                <a:spLocks noGrp="1"/>
+              </p:cNvSpPr>
+              <p:nvPr>
+                <p:ph sz="half" idx="2"/>
+              </p:nvPr>
+            </p:nvSpPr>
+            <p:spPr/>
+            <p:txBody>
+              <a:bodyPr/>
+              <a:lstStyle/>
+              <a:p>
+                <a14:m>
+                  <m:oMath xmlns:m="http://schemas.openxmlformats.org/officeDocument/2006/math">
+                    <m:r>
+                      <a:rPr lang="en-US" b="0" i="1" smtClean="0">
+                        <a:latin typeface="Cambria Math" panose="02040503050406030204" pitchFamily="18" charset="0"/>
+                      </a:rPr>
+                      <m:t>𝛼</m:t>
+                    </m:r>
+                    <m:r>
+                      <a:rPr lang="en-US" b="0" i="1" smtClean="0">
+                        <a:latin typeface="Cambria Math" panose="02040503050406030204" pitchFamily="18" charset="0"/>
+                      </a:rPr>
+                      <m:t>=0.8</m:t>
+                    </m:r>
+                  </m:oMath>
+                </a14:m>
+                <a:endParaRPr lang="en-US" b="0" dirty="0"/>
+              </a:p>
+              <a:p>
+                <a14:m>
+                  <m:oMath xmlns:m="http://schemas.openxmlformats.org/officeDocument/2006/math">
+                    <m:r>
+                      <a:rPr lang="en-US" b="0" i="1" smtClean="0">
+                        <a:latin typeface="Cambria Math" panose="02040503050406030204" pitchFamily="18" charset="0"/>
+                      </a:rPr>
+                      <m:t>𝛽</m:t>
+                    </m:r>
+                    <m:r>
+                      <a:rPr lang="en-US" b="0" i="1" smtClean="0">
+                        <a:latin typeface="Cambria Math" panose="02040503050406030204" pitchFamily="18" charset="0"/>
+                      </a:rPr>
+                      <m:t>=0.8</m:t>
+                    </m:r>
+                  </m:oMath>
+                </a14:m>
+                <a:endParaRPr lang="en-US" b="0" dirty="0"/>
+              </a:p>
+              <a:p>
+                <a:r>
+                  <a:rPr lang="en-US" dirty="0"/>
+                  <a:t>“</a:t>
+                </a:r>
+                <a:r>
+                  <a:rPr lang="en-US" i="1" dirty="0"/>
+                  <a:t>Can</a:t>
+                </a:r>
+                <a:r>
+                  <a:rPr lang="en-US" dirty="0"/>
+                  <a:t>” reward = 1</a:t>
+                </a:r>
+              </a:p>
+              <a:p>
+                <a:r>
+                  <a:rPr lang="en-US" dirty="0"/>
+                  <a:t>“</a:t>
+                </a:r>
+                <a:r>
+                  <a:rPr lang="en-US" i="1" dirty="0"/>
+                  <a:t>Rescue” </a:t>
+                </a:r>
+                <a:r>
+                  <a:rPr lang="en-US" dirty="0"/>
+                  <a:t>reward = -3</a:t>
+                </a:r>
+              </a:p>
+              <a:p>
+                <a:endParaRPr lang="en-US" dirty="0"/>
+              </a:p>
+              <a:p>
+                <a:pPr marL="457200" lvl="1" indent="0">
+                  <a:buNone/>
+                </a:pPr>
+                <a:r>
+                  <a:rPr lang="en-US" dirty="0"/>
+                  <a:t>		</a:t>
+                </a:r>
+              </a:p>
+            </p:txBody>
+          </p:sp>
+        </mc:Choice>
+        <mc:Fallback xmlns="">
+          <p:sp>
+            <p:nvSpPr>
+              <p:cNvPr id="7" name="Content Placeholder 6">
+                <a:extLst>
+                  <a:ext uri="{FF2B5EF4-FFF2-40B4-BE49-F238E27FC236}">
+                    <a16:creationId xmlns:a16="http://schemas.microsoft.com/office/drawing/2014/main" id="{D3B02991-BB3D-06BD-6B6A-1E6063964F04}"/>
+                  </a:ext>
+                </a:extLst>
+              </p:cNvPr>
+              <p:cNvSpPr>
+                <a:spLocks noGrp="1" noRot="1" noChangeAspect="1" noMove="1" noResize="1" noEditPoints="1" noAdjustHandles="1" noChangeArrowheads="1" noChangeShapeType="1" noTextEdit="1"/>
+              </p:cNvSpPr>
+              <p:nvPr>
+                <p:ph sz="half" idx="2"/>
+              </p:nvPr>
+            </p:nvSpPr>
+            <p:spPr>
+              <a:blipFill>
+                <a:blip r:embed="rId4"/>
+                <a:stretch>
+                  <a:fillRect l="-2200" t="-1744"/>
+                </a:stretch>
+              </a:blipFill>
+            </p:spPr>
+            <p:txBody>
+              <a:bodyPr/>
+              <a:lstStyle/>
+              <a:p>
+                <a:r>
+                  <a:rPr lang="en-US">
+                    <a:noFill/>
+                  </a:rPr>
+                  <a:t> </a:t>
+                </a:r>
+              </a:p>
+            </p:txBody>
+          </p:sp>
+        </mc:Fallback>
+      </mc:AlternateContent>
+      <p:sp>
+        <p:nvSpPr>
+          <p:cNvPr id="4" name="Footer Placeholder 3">
+            <a:extLst>
+              <a:ext uri="{FF2B5EF4-FFF2-40B4-BE49-F238E27FC236}">
+                <a16:creationId xmlns:a16="http://schemas.microsoft.com/office/drawing/2014/main" id="{49698196-97AE-0061-BC36-9B3521DE0C6E}"/>
+              </a:ext>
+            </a:extLst>
+          </p:cNvPr>
+          <p:cNvSpPr>
+            <a:spLocks noGrp="1"/>
+          </p:cNvSpPr>
+          <p:nvPr>
+            <p:ph type="ftr" sz="quarter" idx="11"/>
+          </p:nvPr>
+        </p:nvSpPr>
+        <p:spPr/>
+        <p:txBody>
+          <a:bodyPr/>
+          <a:lstStyle/>
+          <a:p>
+            <a:r>
+              <a:rPr lang="en-US"/>
+              <a:t>Davood Wadi</a:t>
+            </a:r>
+          </a:p>
+        </p:txBody>
+      </p:sp>
+      <p:sp>
+        <p:nvSpPr>
+          <p:cNvPr id="5" name="Slide Number Placeholder 4">
+            <a:extLst>
+              <a:ext uri="{FF2B5EF4-FFF2-40B4-BE49-F238E27FC236}">
+                <a16:creationId xmlns:a16="http://schemas.microsoft.com/office/drawing/2014/main" id="{ADF38427-25B5-61B0-76A9-AA1C70CB7715}"/>
+              </a:ext>
+            </a:extLst>
+          </p:cNvPr>
+          <p:cNvSpPr>
+            <a:spLocks noGrp="1"/>
+          </p:cNvSpPr>
+          <p:nvPr>
+            <p:ph type="sldNum" sz="quarter" idx="12"/>
+          </p:nvPr>
+        </p:nvSpPr>
+        <p:spPr/>
+        <p:txBody>
+          <a:bodyPr/>
+          <a:lstStyle/>
+          <a:p>
+            <a:fld id="{3675ED69-EEF9-2244-A839-9AD338E45078}" type="slidenum">
+              <a:rPr lang="en-US" smtClean="0"/>
+              <a:t>12</a:t>
+            </a:fld>
+            <a:endParaRPr lang="en-US"/>
+          </a:p>
+        </p:txBody>
+      </p:sp>
+    </p:spTree>
+    <p:extLst>
+      <p:ext uri="{BB962C8B-B14F-4D97-AF65-F5344CB8AC3E}">
+        <p14:creationId xmlns:p14="http://schemas.microsoft.com/office/powerpoint/2010/main" val="3775125729"/>
+      </p:ext>
+    </p:extLst>
+  </p:cSld>
+  <p:clrMapOvr>
+    <a:masterClrMapping/>
+  </p:clrMapOvr>
+</p:sld>
+</file>
+
+<file path=ppt/slides/slide13.xml><?xml version="1.0" encoding="utf-8"?>
+<p:sld xmlns:a="http://schemas.openxmlformats.org/drawingml/2006/main" xmlns:r="http://schemas.openxmlformats.org/officeDocument/2006/relationships" xmlns:p="http://schemas.openxmlformats.org/presentationml/2006/main">
+  <p:cSld>
+    <p:spTree>
+      <p:nvGrpSpPr>
+        <p:cNvPr id="1" name=""/>
+        <p:cNvGrpSpPr/>
+        <p:nvPr/>
+      </p:nvGrpSpPr>
+      <p:grpSpPr>
+        <a:xfrm>
+          <a:off x="0" y="0"/>
+          <a:ext cx="0" cy="0"/>
+          <a:chOff x="0" y="0"/>
+          <a:chExt cx="0" cy="0"/>
+        </a:xfrm>
+      </p:grpSpPr>
+      <p:sp>
+        <p:nvSpPr>
+          <p:cNvPr id="2" name="Title 1">
+            <a:extLst>
+              <a:ext uri="{FF2B5EF4-FFF2-40B4-BE49-F238E27FC236}">
+                <a16:creationId xmlns:a16="http://schemas.microsoft.com/office/drawing/2014/main" id="{449A3226-B3C3-4D45-AA98-E44B5239BB3F}"/>
+              </a:ext>
+            </a:extLst>
+          </p:cNvPr>
+          <p:cNvSpPr>
+            <a:spLocks noGrp="1"/>
+          </p:cNvSpPr>
+          <p:nvPr>
+            <p:ph type="title"/>
+          </p:nvPr>
+        </p:nvSpPr>
+        <p:spPr/>
+        <p:txBody>
+          <a:bodyPr/>
+          <a:lstStyle/>
+          <a:p>
+            <a:r>
+              <a:rPr lang="en-US" dirty="0"/>
+              <a:t>Value and Policy Approximation</a:t>
+            </a:r>
+          </a:p>
+        </p:txBody>
+      </p:sp>
+      <p:sp>
+        <p:nvSpPr>
+          <p:cNvPr id="3" name="Content Placeholder 2">
+            <a:extLst>
+              <a:ext uri="{FF2B5EF4-FFF2-40B4-BE49-F238E27FC236}">
+                <a16:creationId xmlns:a16="http://schemas.microsoft.com/office/drawing/2014/main" id="{ED99B0C3-52EE-ACA7-048E-463FE251B502}"/>
+              </a:ext>
+            </a:extLst>
+          </p:cNvPr>
+          <p:cNvSpPr>
+            <a:spLocks noGrp="1"/>
+          </p:cNvSpPr>
+          <p:nvPr>
+            <p:ph sz="half" idx="1"/>
+          </p:nvPr>
+        </p:nvSpPr>
+        <p:spPr/>
+        <p:txBody>
+          <a:bodyPr/>
+          <a:lstStyle/>
+          <a:p>
+            <a:r>
+              <a:rPr lang="en-US" dirty="0"/>
+              <a:t>Backgammon</a:t>
+            </a:r>
+          </a:p>
+          <a:p>
+            <a:r>
+              <a:rPr lang="en-US" dirty="0"/>
+              <a:t>10</a:t>
+            </a:r>
+            <a:r>
+              <a:rPr lang="en-US" baseline="30000" dirty="0"/>
+              <a:t>20 </a:t>
+            </a:r>
+            <a:r>
+              <a:rPr lang="en-US" dirty="0"/>
+              <a:t>combinations</a:t>
+            </a:r>
+          </a:p>
+          <a:p>
+            <a:r>
+              <a:rPr lang="en-US" dirty="0"/>
+              <a:t>Thousands of years on modern computers</a:t>
+            </a:r>
+          </a:p>
+          <a:p>
+            <a:r>
+              <a:rPr lang="en-US" dirty="0"/>
+              <a:t>Ways to approximate:</a:t>
+            </a:r>
+          </a:p>
+          <a:p>
+            <a:pPr lvl="1"/>
+            <a:r>
+              <a:rPr lang="en-US" dirty="0"/>
+              <a:t>Value function</a:t>
+            </a:r>
+          </a:p>
+          <a:p>
+            <a:pPr lvl="1"/>
+            <a:r>
+              <a:rPr lang="en-US" dirty="0"/>
+              <a:t>Policy function</a:t>
+            </a:r>
+          </a:p>
+        </p:txBody>
+      </p:sp>
+      <p:sp>
+        <p:nvSpPr>
+          <p:cNvPr id="5" name="Footer Placeholder 4">
+            <a:extLst>
+              <a:ext uri="{FF2B5EF4-FFF2-40B4-BE49-F238E27FC236}">
+                <a16:creationId xmlns:a16="http://schemas.microsoft.com/office/drawing/2014/main" id="{7866A052-5903-DF10-31D0-606E96ACD693}"/>
+              </a:ext>
+            </a:extLst>
+          </p:cNvPr>
+          <p:cNvSpPr>
+            <a:spLocks noGrp="1"/>
+          </p:cNvSpPr>
+          <p:nvPr>
+            <p:ph type="ftr" sz="quarter" idx="11"/>
+          </p:nvPr>
+        </p:nvSpPr>
+        <p:spPr/>
+        <p:txBody>
+          <a:bodyPr/>
+          <a:lstStyle/>
+          <a:p>
+            <a:r>
+              <a:rPr lang="en-US"/>
+              <a:t>Davood Wadi</a:t>
+            </a:r>
+          </a:p>
+        </p:txBody>
+      </p:sp>
+      <p:sp>
+        <p:nvSpPr>
+          <p:cNvPr id="6" name="Slide Number Placeholder 5">
+            <a:extLst>
+              <a:ext uri="{FF2B5EF4-FFF2-40B4-BE49-F238E27FC236}">
+                <a16:creationId xmlns:a16="http://schemas.microsoft.com/office/drawing/2014/main" id="{94F4E0E9-9EDA-7F3E-863D-94EF4EAF181E}"/>
+              </a:ext>
+            </a:extLst>
+          </p:cNvPr>
+          <p:cNvSpPr>
+            <a:spLocks noGrp="1"/>
+          </p:cNvSpPr>
+          <p:nvPr>
+            <p:ph type="sldNum" sz="quarter" idx="12"/>
+          </p:nvPr>
+        </p:nvSpPr>
+        <p:spPr/>
+        <p:txBody>
+          <a:bodyPr/>
+          <a:lstStyle/>
+          <a:p>
+            <a:fld id="{3675ED69-EEF9-2244-A839-9AD338E45078}" type="slidenum">
+              <a:rPr lang="en-US" smtClean="0"/>
+              <a:t>13</a:t>
+            </a:fld>
+            <a:endParaRPr lang="en-US"/>
+          </a:p>
+        </p:txBody>
+      </p:sp>
+      <p:pic>
+        <p:nvPicPr>
+          <p:cNvPr id="1026" name="Picture 2">
+            <a:extLst>
+              <a:ext uri="{FF2B5EF4-FFF2-40B4-BE49-F238E27FC236}">
+                <a16:creationId xmlns:a16="http://schemas.microsoft.com/office/drawing/2014/main" id="{683AAFCF-B37B-0752-55C4-3E7539800CAD}"/>
+              </a:ext>
+            </a:extLst>
+          </p:cNvPr>
+          <p:cNvPicPr>
+            <a:picLocks noGrp="1" noChangeAspect="1" noChangeArrowheads="1"/>
+          </p:cNvPicPr>
+          <p:nvPr>
+            <p:ph sz="half" idx="2"/>
+          </p:nvPr>
+        </p:nvPicPr>
+        <p:blipFill>
+          <a:blip r:embed="rId2">
+            <a:extLst>
+              <a:ext uri="{28A0092B-C50C-407E-A947-70E740481C1C}">
+                <a14:useLocalDpi xmlns:a14="http://schemas.microsoft.com/office/drawing/2010/main" val="0"/>
+              </a:ext>
+            </a:extLst>
+          </a:blip>
+          <a:srcRect/>
+          <a:stretch>
+            <a:fillRect/>
+          </a:stretch>
+        </p:blipFill>
+        <p:spPr bwMode="auto">
+          <a:xfrm>
+            <a:off x="6172200" y="2316221"/>
+            <a:ext cx="5181600" cy="3370146"/>
+          </a:xfrm>
+          <a:prstGeom prst="rect">
+            <a:avLst/>
+          </a:prstGeom>
+          <a:noFill/>
+          <a:extLst>
+            <a:ext uri="{909E8E84-426E-40DD-AFC4-6F175D3DCCD1}">
+              <a14:hiddenFill xmlns:a14="http://schemas.microsoft.com/office/drawing/2010/main">
+                <a:solidFill>
+                  <a:srgbClr val="FFFFFF"/>
+                </a:solidFill>
+              </a14:hiddenFill>
+            </a:ext>
+          </a:extLst>
+        </p:spPr>
+      </p:pic>
+    </p:spTree>
+    <p:extLst>
+      <p:ext uri="{BB962C8B-B14F-4D97-AF65-F5344CB8AC3E}">
+        <p14:creationId xmlns:p14="http://schemas.microsoft.com/office/powerpoint/2010/main" val="2992694334"/>
+      </p:ext>
+    </p:extLst>
+  </p:cSld>
+  <p:clrMapOvr>
+    <a:masterClrMapping/>
+  </p:clrMapOvr>
+</p:sld>
+</file>
+
+<file path=ppt/slides/slide14.xml><?xml version="1.0" encoding="utf-8"?>
+<p:sld xmlns:a="http://schemas.openxmlformats.org/drawingml/2006/main" xmlns:r="http://schemas.openxmlformats.org/officeDocument/2006/relationships" xmlns:p="http://schemas.openxmlformats.org/presentationml/2006/main">
+  <p:cSld>
+    <p:spTree>
+      <p:nvGrpSpPr>
+        <p:cNvPr id="1" name=""/>
+        <p:cNvGrpSpPr/>
+        <p:nvPr/>
+      </p:nvGrpSpPr>
+      <p:grpSpPr>
+        <a:xfrm>
+          <a:off x="0" y="0"/>
+          <a:ext cx="0" cy="0"/>
+          <a:chOff x="0" y="0"/>
+          <a:chExt cx="0" cy="0"/>
+        </a:xfrm>
+      </p:grpSpPr>
+      <p:sp>
+        <p:nvSpPr>
+          <p:cNvPr id="2" name="Title 1">
+            <a:extLst>
+              <a:ext uri="{FF2B5EF4-FFF2-40B4-BE49-F238E27FC236}">
+                <a16:creationId xmlns:a16="http://schemas.microsoft.com/office/drawing/2014/main" id="{E6DAEE67-F693-D17B-7EB2-1C1EFE97FDE2}"/>
+              </a:ext>
+            </a:extLst>
+          </p:cNvPr>
+          <p:cNvSpPr>
+            <a:spLocks noGrp="1"/>
+          </p:cNvSpPr>
+          <p:nvPr>
+            <p:ph type="title"/>
+          </p:nvPr>
+        </p:nvSpPr>
+        <p:spPr/>
+        <p:txBody>
+          <a:bodyPr/>
+          <a:lstStyle/>
+          <a:p>
+            <a:r>
+              <a:rPr lang="en-US" dirty="0"/>
+              <a:t>Function Approximation</a:t>
+            </a:r>
+          </a:p>
+        </p:txBody>
+      </p:sp>
+      <p:sp>
+        <p:nvSpPr>
+          <p:cNvPr id="3" name="Content Placeholder 2">
+            <a:extLst>
+              <a:ext uri="{FF2B5EF4-FFF2-40B4-BE49-F238E27FC236}">
+                <a16:creationId xmlns:a16="http://schemas.microsoft.com/office/drawing/2014/main" id="{951178F2-1C9C-7998-2E98-95BFF15D2F81}"/>
+              </a:ext>
+            </a:extLst>
+          </p:cNvPr>
+          <p:cNvSpPr>
+            <a:spLocks noGrp="1"/>
+          </p:cNvSpPr>
+          <p:nvPr>
+            <p:ph sz="half" idx="1"/>
+          </p:nvPr>
+        </p:nvSpPr>
+        <p:spPr/>
+        <p:txBody>
+          <a:bodyPr/>
+          <a:lstStyle/>
+          <a:p>
+            <a:r>
+              <a:rPr lang="en-US" dirty="0"/>
+              <a:t>By modeling Y = f(X)</a:t>
+            </a:r>
+          </a:p>
+          <a:p>
+            <a:r>
+              <a:rPr lang="en-US" dirty="0"/>
+              <a:t>For new X, get values of Y</a:t>
+            </a:r>
+          </a:p>
+          <a:p>
+            <a:r>
+              <a:rPr lang="en-US" dirty="0"/>
+              <a:t>Millions or billions of new X, same storage cost</a:t>
+            </a:r>
+          </a:p>
+        </p:txBody>
+      </p:sp>
+      <p:sp>
+        <p:nvSpPr>
+          <p:cNvPr id="5" name="Footer Placeholder 4">
+            <a:extLst>
+              <a:ext uri="{FF2B5EF4-FFF2-40B4-BE49-F238E27FC236}">
+                <a16:creationId xmlns:a16="http://schemas.microsoft.com/office/drawing/2014/main" id="{4B091FDC-234F-8EEC-7006-D2137D3041D7}"/>
+              </a:ext>
+            </a:extLst>
+          </p:cNvPr>
+          <p:cNvSpPr>
+            <a:spLocks noGrp="1"/>
+          </p:cNvSpPr>
+          <p:nvPr>
+            <p:ph type="ftr" sz="quarter" idx="11"/>
+          </p:nvPr>
+        </p:nvSpPr>
+        <p:spPr/>
+        <p:txBody>
+          <a:bodyPr/>
+          <a:lstStyle/>
+          <a:p>
+            <a:r>
+              <a:rPr lang="en-US"/>
+              <a:t>Davood Wadi</a:t>
+            </a:r>
+          </a:p>
+        </p:txBody>
+      </p:sp>
+      <p:sp>
+        <p:nvSpPr>
+          <p:cNvPr id="6" name="Slide Number Placeholder 5">
+            <a:extLst>
+              <a:ext uri="{FF2B5EF4-FFF2-40B4-BE49-F238E27FC236}">
+                <a16:creationId xmlns:a16="http://schemas.microsoft.com/office/drawing/2014/main" id="{74C43A42-CA07-F27F-8902-C3BB193EBC3E}"/>
+              </a:ext>
+            </a:extLst>
+          </p:cNvPr>
+          <p:cNvSpPr>
+            <a:spLocks noGrp="1"/>
+          </p:cNvSpPr>
+          <p:nvPr>
+            <p:ph type="sldNum" sz="quarter" idx="12"/>
+          </p:nvPr>
+        </p:nvSpPr>
+        <p:spPr/>
+        <p:txBody>
+          <a:bodyPr/>
+          <a:lstStyle/>
+          <a:p>
+            <a:fld id="{3675ED69-EEF9-2244-A839-9AD338E45078}" type="slidenum">
+              <a:rPr lang="en-US" smtClean="0"/>
+              <a:t>14</a:t>
+            </a:fld>
+            <a:endParaRPr lang="en-US"/>
+          </a:p>
+        </p:txBody>
+      </p:sp>
+      <p:pic>
+        <p:nvPicPr>
+          <p:cNvPr id="2050" name="Picture 2" descr="Linear Regression - Geeksforgeeks">
+            <a:extLst>
+              <a:ext uri="{FF2B5EF4-FFF2-40B4-BE49-F238E27FC236}">
+                <a16:creationId xmlns:a16="http://schemas.microsoft.com/office/drawing/2014/main" id="{2B898F7F-06BE-3783-0087-B06A840751FF}"/>
+              </a:ext>
+            </a:extLst>
+          </p:cNvPr>
+          <p:cNvPicPr>
+            <a:picLocks noGrp="1" noChangeAspect="1" noChangeArrowheads="1"/>
+          </p:cNvPicPr>
+          <p:nvPr>
+            <p:ph sz="half" idx="2"/>
+          </p:nvPr>
+        </p:nvPicPr>
+        <p:blipFill>
+          <a:blip r:embed="rId2">
+            <a:extLst>
+              <a:ext uri="{28A0092B-C50C-407E-A947-70E740481C1C}">
+                <a14:useLocalDpi xmlns:a14="http://schemas.microsoft.com/office/drawing/2010/main" val="0"/>
+              </a:ext>
+            </a:extLst>
+          </a:blip>
+          <a:srcRect/>
+          <a:stretch>
+            <a:fillRect/>
+          </a:stretch>
+        </p:blipFill>
+        <p:spPr bwMode="auto">
+          <a:xfrm>
+            <a:off x="6172200" y="2281003"/>
+            <a:ext cx="5181600" cy="3440582"/>
+          </a:xfrm>
+          <a:prstGeom prst="rect">
+            <a:avLst/>
+          </a:prstGeom>
+          <a:noFill/>
+          <a:extLst>
+            <a:ext uri="{909E8E84-426E-40DD-AFC4-6F175D3DCCD1}">
+              <a14:hiddenFill xmlns:a14="http://schemas.microsoft.com/office/drawing/2010/main">
+                <a:solidFill>
+                  <a:srgbClr val="FFFFFF"/>
+                </a:solidFill>
+              </a14:hiddenFill>
+            </a:ext>
+          </a:extLst>
+        </p:spPr>
+      </p:pic>
+    </p:spTree>
+    <p:extLst>
+      <p:ext uri="{BB962C8B-B14F-4D97-AF65-F5344CB8AC3E}">
+        <p14:creationId xmlns:p14="http://schemas.microsoft.com/office/powerpoint/2010/main" val="961609913"/>
+      </p:ext>
+    </p:extLst>
+  </p:cSld>
+  <p:clrMapOvr>
+    <a:masterClrMapping/>
+  </p:clrMapOvr>
+</p:sld>
+</file>
+
+<file path=ppt/slides/slide15.xml><?xml version="1.0" encoding="utf-8"?>
+<p:sld xmlns:a="http://schemas.openxmlformats.org/drawingml/2006/main" xmlns:r="http://schemas.openxmlformats.org/officeDocument/2006/relationships" xmlns:p="http://schemas.openxmlformats.org/presentationml/2006/main">
+  <p:cSld>
+    <p:spTree>
+      <p:nvGrpSpPr>
+        <p:cNvPr id="1" name=""/>
+        <p:cNvGrpSpPr/>
+        <p:nvPr/>
+      </p:nvGrpSpPr>
+      <p:grpSpPr>
+        <a:xfrm>
+          <a:off x="0" y="0"/>
+          <a:ext cx="0" cy="0"/>
+          <a:chOff x="0" y="0"/>
+          <a:chExt cx="0" cy="0"/>
+        </a:xfrm>
+      </p:grpSpPr>
+      <p:sp>
+        <p:nvSpPr>
+          <p:cNvPr id="2" name="Title 1">
+            <a:extLst>
+              <a:ext uri="{FF2B5EF4-FFF2-40B4-BE49-F238E27FC236}">
+                <a16:creationId xmlns:a16="http://schemas.microsoft.com/office/drawing/2014/main" id="{796F2002-8C0B-E295-5755-35C0C6930D8D}"/>
+              </a:ext>
+            </a:extLst>
+          </p:cNvPr>
+          <p:cNvSpPr>
+            <a:spLocks noGrp="1"/>
+          </p:cNvSpPr>
+          <p:nvPr>
+            <p:ph type="title"/>
+          </p:nvPr>
+        </p:nvSpPr>
+        <p:spPr/>
+        <p:txBody>
+          <a:bodyPr/>
+          <a:lstStyle/>
+          <a:p>
+            <a:r>
+              <a:rPr lang="en-US" dirty="0"/>
+              <a:t>Functional Approximation</a:t>
+            </a:r>
+          </a:p>
+        </p:txBody>
+      </p:sp>
+      <p:sp>
+        <p:nvSpPr>
+          <p:cNvPr id="7" name="Content Placeholder 6">
+            <a:extLst>
+              <a:ext uri="{FF2B5EF4-FFF2-40B4-BE49-F238E27FC236}">
+                <a16:creationId xmlns:a16="http://schemas.microsoft.com/office/drawing/2014/main" id="{62C315E3-74F7-7133-CF9B-ADE83D0A2F20}"/>
+              </a:ext>
+            </a:extLst>
+          </p:cNvPr>
+          <p:cNvSpPr>
+            <a:spLocks noGrp="1"/>
+          </p:cNvSpPr>
+          <p:nvPr>
+            <p:ph idx="1"/>
+          </p:nvPr>
+        </p:nvSpPr>
+        <p:spPr/>
+        <p:txBody>
+          <a:bodyPr/>
+          <a:lstStyle/>
+          <a:p>
+            <a:r>
+              <a:rPr lang="en-US" dirty="0"/>
+              <a:t>To compute and store values and policies, use high-capacity models (e.g. neural networks).</a:t>
+            </a:r>
+          </a:p>
+          <a:p>
+            <a:r>
+              <a:rPr lang="en-US" dirty="0"/>
+              <a:t>Reduce storage cost</a:t>
+            </a:r>
+          </a:p>
+          <a:p>
+            <a:r>
+              <a:rPr lang="en-US" dirty="0"/>
+              <a:t>Computation on as-needed basis</a:t>
+            </a:r>
+          </a:p>
+        </p:txBody>
+      </p:sp>
+      <p:sp>
+        <p:nvSpPr>
+          <p:cNvPr id="5" name="Footer Placeholder 4">
+            <a:extLst>
+              <a:ext uri="{FF2B5EF4-FFF2-40B4-BE49-F238E27FC236}">
+                <a16:creationId xmlns:a16="http://schemas.microsoft.com/office/drawing/2014/main" id="{B81EA53A-6F2C-C52A-ACF8-056D05A8A2E9}"/>
+              </a:ext>
+            </a:extLst>
+          </p:cNvPr>
+          <p:cNvSpPr>
+            <a:spLocks noGrp="1"/>
+          </p:cNvSpPr>
+          <p:nvPr>
+            <p:ph type="ftr" sz="quarter" idx="11"/>
+          </p:nvPr>
+        </p:nvSpPr>
+        <p:spPr/>
+        <p:txBody>
+          <a:bodyPr/>
+          <a:lstStyle/>
+          <a:p>
+            <a:r>
+              <a:rPr lang="en-US"/>
+              <a:t>Davood Wadi</a:t>
+            </a:r>
+          </a:p>
+        </p:txBody>
+      </p:sp>
+      <p:sp>
+        <p:nvSpPr>
+          <p:cNvPr id="6" name="Slide Number Placeholder 5">
+            <a:extLst>
+              <a:ext uri="{FF2B5EF4-FFF2-40B4-BE49-F238E27FC236}">
+                <a16:creationId xmlns:a16="http://schemas.microsoft.com/office/drawing/2014/main" id="{A8F3D7A4-EC3D-8EDA-74DB-1EE2FCEC0CA7}"/>
+              </a:ext>
+            </a:extLst>
+          </p:cNvPr>
+          <p:cNvSpPr>
+            <a:spLocks noGrp="1"/>
+          </p:cNvSpPr>
+          <p:nvPr>
+            <p:ph type="sldNum" sz="quarter" idx="12"/>
+          </p:nvPr>
+        </p:nvSpPr>
+        <p:spPr/>
+        <p:txBody>
+          <a:bodyPr/>
+          <a:lstStyle/>
+          <a:p>
+            <a:fld id="{3675ED69-EEF9-2244-A839-9AD338E45078}" type="slidenum">
+              <a:rPr lang="en-US" smtClean="0"/>
+              <a:t>15</a:t>
+            </a:fld>
+            <a:endParaRPr lang="en-US"/>
+          </a:p>
+        </p:txBody>
+      </p:sp>
+    </p:spTree>
+    <p:extLst>
+      <p:ext uri="{BB962C8B-B14F-4D97-AF65-F5344CB8AC3E}">
+        <p14:creationId xmlns:p14="http://schemas.microsoft.com/office/powerpoint/2010/main" val="507965155"/>
+      </p:ext>
+    </p:extLst>
+  </p:cSld>
+  <p:clrMapOvr>
+    <a:masterClrMapping/>
+  </p:clrMapOvr>
+</p:sld>
+</file>
+
+<file path=ppt/slides/slide16.xml><?xml version="1.0" encoding="utf-8"?>
+<p:sld xmlns:a="http://schemas.openxmlformats.org/drawingml/2006/main" xmlns:r="http://schemas.openxmlformats.org/officeDocument/2006/relationships" xmlns:p="http://schemas.openxmlformats.org/presentationml/2006/main">
+  <p:cSld>
+    <p:spTree>
+      <p:nvGrpSpPr>
+        <p:cNvPr id="1" name=""/>
+        <p:cNvGrpSpPr/>
+        <p:nvPr/>
+      </p:nvGrpSpPr>
+      <p:grpSpPr>
+        <a:xfrm>
+          <a:off x="0" y="0"/>
+          <a:ext cx="0" cy="0"/>
+          <a:chOff x="0" y="0"/>
+          <a:chExt cx="0" cy="0"/>
+        </a:xfrm>
+      </p:grpSpPr>
+      <p:sp>
+        <p:nvSpPr>
+          <p:cNvPr id="2" name="Title 1">
+            <a:extLst>
+              <a:ext uri="{FF2B5EF4-FFF2-40B4-BE49-F238E27FC236}">
+                <a16:creationId xmlns:a16="http://schemas.microsoft.com/office/drawing/2014/main" id="{BA412423-0764-08FC-2EAC-DA0B3F7CDD6A}"/>
+              </a:ext>
+            </a:extLst>
+          </p:cNvPr>
+          <p:cNvSpPr>
+            <a:spLocks noGrp="1"/>
+          </p:cNvSpPr>
+          <p:nvPr>
+            <p:ph type="title"/>
+          </p:nvPr>
+        </p:nvSpPr>
+        <p:spPr/>
+        <p:txBody>
+          <a:bodyPr/>
+          <a:lstStyle/>
+          <a:p>
+            <a:r>
+              <a:rPr lang="en-US" dirty="0"/>
+              <a:t>Dynamic Programming</a:t>
+            </a:r>
+          </a:p>
+        </p:txBody>
+      </p:sp>
+      <p:sp>
+        <p:nvSpPr>
+          <p:cNvPr id="3" name="Content Placeholder 2">
+            <a:extLst>
+              <a:ext uri="{FF2B5EF4-FFF2-40B4-BE49-F238E27FC236}">
+                <a16:creationId xmlns:a16="http://schemas.microsoft.com/office/drawing/2014/main" id="{E4248267-B4F0-7B60-5921-28392BFBFE69}"/>
+              </a:ext>
+            </a:extLst>
+          </p:cNvPr>
+          <p:cNvSpPr>
+            <a:spLocks noGrp="1"/>
+          </p:cNvSpPr>
+          <p:nvPr>
+            <p:ph idx="1"/>
+          </p:nvPr>
+        </p:nvSpPr>
+        <p:spPr/>
+        <p:txBody>
+          <a:bodyPr/>
+          <a:lstStyle/>
+          <a:p>
+            <a:r>
+              <a:rPr lang="en-US" dirty="0"/>
+              <a:t>Algorithms </a:t>
+            </a:r>
+            <a:r>
+              <a:rPr lang="en-US"/>
+              <a:t>for solving MDPs</a:t>
+            </a:r>
+          </a:p>
+          <a:p>
+            <a:endParaRPr lang="en-US"/>
+          </a:p>
+        </p:txBody>
+      </p:sp>
+      <p:sp>
+        <p:nvSpPr>
+          <p:cNvPr id="4" name="Footer Placeholder 3">
+            <a:extLst>
+              <a:ext uri="{FF2B5EF4-FFF2-40B4-BE49-F238E27FC236}">
+                <a16:creationId xmlns:a16="http://schemas.microsoft.com/office/drawing/2014/main" id="{F592B2F8-8A7A-8E41-DE85-73C4B784E347}"/>
+              </a:ext>
+            </a:extLst>
+          </p:cNvPr>
+          <p:cNvSpPr>
+            <a:spLocks noGrp="1"/>
+          </p:cNvSpPr>
+          <p:nvPr>
+            <p:ph type="ftr" sz="quarter" idx="11"/>
+          </p:nvPr>
+        </p:nvSpPr>
+        <p:spPr/>
+        <p:txBody>
+          <a:bodyPr/>
+          <a:lstStyle/>
+          <a:p>
+            <a:r>
+              <a:rPr lang="en-US"/>
+              <a:t>Davood Wadi</a:t>
+            </a:r>
+          </a:p>
+        </p:txBody>
+      </p:sp>
+      <p:sp>
+        <p:nvSpPr>
+          <p:cNvPr id="5" name="Slide Number Placeholder 4">
+            <a:extLst>
+              <a:ext uri="{FF2B5EF4-FFF2-40B4-BE49-F238E27FC236}">
+                <a16:creationId xmlns:a16="http://schemas.microsoft.com/office/drawing/2014/main" id="{6596EB4F-4B35-71A3-7809-65D77677A826}"/>
+              </a:ext>
+            </a:extLst>
+          </p:cNvPr>
+          <p:cNvSpPr>
+            <a:spLocks noGrp="1"/>
+          </p:cNvSpPr>
+          <p:nvPr>
+            <p:ph type="sldNum" sz="quarter" idx="12"/>
+          </p:nvPr>
+        </p:nvSpPr>
+        <p:spPr/>
+        <p:txBody>
+          <a:bodyPr/>
+          <a:lstStyle/>
+          <a:p>
+            <a:fld id="{3675ED69-EEF9-2244-A839-9AD338E45078}" type="slidenum">
+              <a:rPr lang="en-US" smtClean="0"/>
+              <a:t>16</a:t>
+            </a:fld>
+            <a:endParaRPr lang="en-US"/>
+          </a:p>
+        </p:txBody>
+      </p:sp>
+    </p:spTree>
+    <p:extLst>
+      <p:ext uri="{BB962C8B-B14F-4D97-AF65-F5344CB8AC3E}">
+        <p14:creationId xmlns:p14="http://schemas.microsoft.com/office/powerpoint/2010/main" val="2083309211"/>
+      </p:ext>
+    </p:extLst>
+  </p:cSld>
+  <p:clrMapOvr>
+    <a:masterClrMapping/>
+  </p:clrMapOvr>
+</p:sld>
+</file>
+
+<file path=ppt/slides/slide17.xml><?xml version="1.0" encoding="utf-8"?>
+<p:sld xmlns:a="http://schemas.openxmlformats.org/drawingml/2006/main" xmlns:r="http://schemas.openxmlformats.org/officeDocument/2006/relationships" xmlns:p="http://schemas.openxmlformats.org/presentationml/2006/main">
+  <p:cSld>
+    <p:spTree>
+      <p:nvGrpSpPr>
+        <p:cNvPr id="1" name=""/>
+        <p:cNvGrpSpPr/>
+        <p:nvPr/>
+      </p:nvGrpSpPr>
+      <p:grpSpPr>
+        <a:xfrm>
+          <a:off x="0" y="0"/>
+          <a:ext cx="0" cy="0"/>
+          <a:chOff x="0" y="0"/>
+          <a:chExt cx="0" cy="0"/>
+        </a:xfrm>
+      </p:grpSpPr>
+      <p:sp>
+        <p:nvSpPr>
+          <p:cNvPr id="2" name="Title 1">
+            <a:extLst>
+              <a:ext uri="{FF2B5EF4-FFF2-40B4-BE49-F238E27FC236}">
+                <a16:creationId xmlns:a16="http://schemas.microsoft.com/office/drawing/2014/main" id="{821BD279-F7BD-5780-6676-D3CDB3586104}"/>
+              </a:ext>
+            </a:extLst>
+          </p:cNvPr>
+          <p:cNvSpPr>
+            <a:spLocks noGrp="1"/>
+          </p:cNvSpPr>
+          <p:nvPr>
+            <p:ph type="title"/>
+          </p:nvPr>
+        </p:nvSpPr>
+        <p:spPr/>
+        <p:txBody>
+          <a:bodyPr/>
+          <a:lstStyle/>
+          <a:p>
+            <a:r>
+              <a:rPr lang="en-US" dirty="0"/>
+              <a:t>Monte Carlo</a:t>
+            </a:r>
+          </a:p>
+        </p:txBody>
+      </p:sp>
+      <p:sp>
+        <p:nvSpPr>
+          <p:cNvPr id="3" name="Content Placeholder 2">
+            <a:extLst>
+              <a:ext uri="{FF2B5EF4-FFF2-40B4-BE49-F238E27FC236}">
+                <a16:creationId xmlns:a16="http://schemas.microsoft.com/office/drawing/2014/main" id="{148ABAFB-7580-ED02-CFB0-CC6775CABC49}"/>
+              </a:ext>
+            </a:extLst>
+          </p:cNvPr>
+          <p:cNvSpPr>
+            <a:spLocks noGrp="1"/>
+          </p:cNvSpPr>
+          <p:nvPr>
+            <p:ph idx="1"/>
+          </p:nvPr>
+        </p:nvSpPr>
+        <p:spPr/>
+        <p:txBody>
+          <a:bodyPr>
+            <a:normAutofit/>
+          </a:bodyPr>
+          <a:lstStyle/>
+          <a:p>
+            <a:r>
+              <a:rPr lang="en-US" dirty="0"/>
+              <a:t>Monte Carlo methods require only experience:</a:t>
+            </a:r>
+          </a:p>
+          <a:p>
+            <a:pPr lvl="1"/>
+            <a:r>
+              <a:rPr lang="en-US" dirty="0"/>
+              <a:t>sample sequences of states, actions, and rewards from </a:t>
+            </a:r>
+            <a:r>
+              <a:rPr lang="en-US" b="1" dirty="0"/>
+              <a:t>actual</a:t>
+            </a:r>
+            <a:r>
+              <a:rPr lang="en-US" dirty="0"/>
+              <a:t> or </a:t>
+            </a:r>
+            <a:r>
+              <a:rPr lang="en-US" b="1" dirty="0"/>
+              <a:t>simulated </a:t>
+            </a:r>
+            <a:r>
+              <a:rPr lang="en-US" dirty="0"/>
+              <a:t>interaction with an environment.</a:t>
+            </a:r>
+          </a:p>
+          <a:p>
+            <a:r>
+              <a:rPr lang="en-US" dirty="0"/>
+              <a:t>Simulation: </a:t>
+            </a:r>
+          </a:p>
+          <a:p>
+            <a:pPr lvl="1"/>
+            <a:r>
+              <a:rPr lang="en-US" dirty="0"/>
+              <a:t>a </a:t>
+            </a:r>
+            <a:r>
+              <a:rPr lang="en-US" b="1" dirty="0"/>
+              <a:t>model</a:t>
+            </a:r>
+            <a:r>
+              <a:rPr lang="en-US" dirty="0"/>
+              <a:t> is required, </a:t>
+            </a:r>
+          </a:p>
+          <a:p>
+            <a:pPr lvl="1"/>
+            <a:r>
+              <a:rPr lang="en-US" dirty="0"/>
+              <a:t>the model need only generate </a:t>
+            </a:r>
+            <a:r>
+              <a:rPr lang="en-US" b="1" dirty="0"/>
+              <a:t>sample</a:t>
+            </a:r>
+            <a:r>
+              <a:rPr lang="en-US" dirty="0"/>
+              <a:t> transitions, </a:t>
+            </a:r>
+            <a:br>
+              <a:rPr lang="en-US" dirty="0"/>
+            </a:br>
+            <a:r>
+              <a:rPr lang="en-US" dirty="0"/>
+              <a:t>not the complete probability distributions of all possible transitions that is required for dynamic programming (DP).</a:t>
+            </a:r>
+          </a:p>
+          <a:p>
+            <a:endParaRPr lang="en-US" dirty="0"/>
+          </a:p>
+        </p:txBody>
+      </p:sp>
+      <p:sp>
+        <p:nvSpPr>
+          <p:cNvPr id="4" name="Footer Placeholder 3">
+            <a:extLst>
+              <a:ext uri="{FF2B5EF4-FFF2-40B4-BE49-F238E27FC236}">
+                <a16:creationId xmlns:a16="http://schemas.microsoft.com/office/drawing/2014/main" id="{2DA7F823-0426-E918-17BD-DBD8368590E2}"/>
+              </a:ext>
+            </a:extLst>
+          </p:cNvPr>
+          <p:cNvSpPr>
+            <a:spLocks noGrp="1"/>
+          </p:cNvSpPr>
+          <p:nvPr>
+            <p:ph type="ftr" sz="quarter" idx="11"/>
+          </p:nvPr>
+        </p:nvSpPr>
+        <p:spPr/>
+        <p:txBody>
+          <a:bodyPr/>
+          <a:lstStyle/>
+          <a:p>
+            <a:r>
+              <a:rPr lang="en-US"/>
+              <a:t>Davood Wadi</a:t>
+            </a:r>
+          </a:p>
+        </p:txBody>
+      </p:sp>
+      <p:sp>
+        <p:nvSpPr>
+          <p:cNvPr id="5" name="Slide Number Placeholder 4">
+            <a:extLst>
+              <a:ext uri="{FF2B5EF4-FFF2-40B4-BE49-F238E27FC236}">
+                <a16:creationId xmlns:a16="http://schemas.microsoft.com/office/drawing/2014/main" id="{131D5AD0-2245-FA23-5C59-4F3A7E4DB76A}"/>
+              </a:ext>
+            </a:extLst>
+          </p:cNvPr>
+          <p:cNvSpPr>
+            <a:spLocks noGrp="1"/>
+          </p:cNvSpPr>
+          <p:nvPr>
+            <p:ph type="sldNum" sz="quarter" idx="12"/>
+          </p:nvPr>
+        </p:nvSpPr>
+        <p:spPr/>
+        <p:txBody>
+          <a:bodyPr/>
+          <a:lstStyle/>
+          <a:p>
+            <a:fld id="{3675ED69-EEF9-2244-A839-9AD338E45078}" type="slidenum">
+              <a:rPr lang="en-US" smtClean="0"/>
+              <a:t>17</a:t>
+            </a:fld>
+            <a:endParaRPr lang="en-US"/>
+          </a:p>
+        </p:txBody>
+      </p:sp>
+      <p:sp>
+        <p:nvSpPr>
+          <p:cNvPr id="6" name="TextBox 5">
+            <a:extLst>
+              <a:ext uri="{FF2B5EF4-FFF2-40B4-BE49-F238E27FC236}">
+                <a16:creationId xmlns:a16="http://schemas.microsoft.com/office/drawing/2014/main" id="{EEA48DFD-6AB8-A329-09D3-2E9F047BF7EC}"/>
+              </a:ext>
+            </a:extLst>
+          </p:cNvPr>
+          <p:cNvSpPr txBox="1"/>
+          <p:nvPr/>
+        </p:nvSpPr>
+        <p:spPr>
+          <a:xfrm>
+            <a:off x="254000" y="6365875"/>
+            <a:ext cx="2593146" cy="369332"/>
+          </a:xfrm>
+          <a:prstGeom prst="rect">
+            <a:avLst/>
+          </a:prstGeom>
+          <a:noFill/>
+        </p:spPr>
+        <p:txBody>
+          <a:bodyPr wrap="none" rtlCol="0">
+            <a:spAutoFit/>
+          </a:bodyPr>
+          <a:lstStyle/>
+          <a:p>
+            <a:r>
+              <a:rPr lang="en-US" dirty="0"/>
+              <a:t>Source: Richard S. Sutton.</a:t>
+            </a:r>
+          </a:p>
+        </p:txBody>
+      </p:sp>
+    </p:spTree>
+    <p:extLst>
+      <p:ext uri="{BB962C8B-B14F-4D97-AF65-F5344CB8AC3E}">
+        <p14:creationId xmlns:p14="http://schemas.microsoft.com/office/powerpoint/2010/main" val="3280884544"/>
+      </p:ext>
+    </p:extLst>
+  </p:cSld>
+  <p:clrMapOvr>
+    <a:masterClrMapping/>
+  </p:clrMapOvr>
+</p:sld>
+</file>
+
+<file path=ppt/slides/slide18.xml><?xml version="1.0" encoding="utf-8"?>
+<p:sld xmlns:a="http://schemas.openxmlformats.org/drawingml/2006/main" xmlns:r="http://schemas.openxmlformats.org/officeDocument/2006/relationships" xmlns:p="http://schemas.openxmlformats.org/presentationml/2006/main">
+  <p:cSld>
+    <p:spTree>
+      <p:nvGrpSpPr>
+        <p:cNvPr id="1" name=""/>
+        <p:cNvGrpSpPr/>
+        <p:nvPr/>
+      </p:nvGrpSpPr>
+      <p:grpSpPr>
+        <a:xfrm>
+          <a:off x="0" y="0"/>
+          <a:ext cx="0" cy="0"/>
+          <a:chOff x="0" y="0"/>
+          <a:chExt cx="0" cy="0"/>
+        </a:xfrm>
+      </p:grpSpPr>
+      <p:sp>
+        <p:nvSpPr>
+          <p:cNvPr id="2" name="Title 1">
+            <a:extLst>
+              <a:ext uri="{FF2B5EF4-FFF2-40B4-BE49-F238E27FC236}">
+                <a16:creationId xmlns:a16="http://schemas.microsoft.com/office/drawing/2014/main" id="{821BD279-F7BD-5780-6676-D3CDB3586104}"/>
+              </a:ext>
+            </a:extLst>
+          </p:cNvPr>
+          <p:cNvSpPr>
+            <a:spLocks noGrp="1"/>
+          </p:cNvSpPr>
+          <p:nvPr>
+            <p:ph type="title"/>
+          </p:nvPr>
+        </p:nvSpPr>
+        <p:spPr/>
+        <p:txBody>
+          <a:bodyPr/>
+          <a:lstStyle/>
+          <a:p>
+            <a:r>
+              <a:rPr lang="en-US" dirty="0"/>
+              <a:t>Monte Carlo</a:t>
+            </a:r>
+          </a:p>
+        </p:txBody>
+      </p:sp>
+      <p:sp>
+        <p:nvSpPr>
+          <p:cNvPr id="3" name="Content Placeholder 2">
+            <a:extLst>
+              <a:ext uri="{FF2B5EF4-FFF2-40B4-BE49-F238E27FC236}">
+                <a16:creationId xmlns:a16="http://schemas.microsoft.com/office/drawing/2014/main" id="{148ABAFB-7580-ED02-CFB0-CC6775CABC49}"/>
+              </a:ext>
+            </a:extLst>
+          </p:cNvPr>
+          <p:cNvSpPr>
+            <a:spLocks noGrp="1"/>
+          </p:cNvSpPr>
+          <p:nvPr>
+            <p:ph idx="1"/>
+          </p:nvPr>
+        </p:nvSpPr>
+        <p:spPr/>
+        <p:txBody>
+          <a:bodyPr>
+            <a:normAutofit/>
+          </a:bodyPr>
+          <a:lstStyle/>
+          <a:p>
+            <a:r>
+              <a:rPr lang="en-US" dirty="0"/>
+              <a:t>In many cases it is easy to </a:t>
+            </a:r>
+            <a:r>
+              <a:rPr lang="en-US" b="1" dirty="0"/>
+              <a:t>generate</a:t>
+            </a:r>
+            <a:r>
+              <a:rPr lang="en-US" dirty="0"/>
+              <a:t> experience </a:t>
+            </a:r>
+            <a:r>
+              <a:rPr lang="en-US" b="1" dirty="0"/>
+              <a:t>sampled</a:t>
+            </a:r>
+            <a:r>
+              <a:rPr lang="en-US" dirty="0"/>
+              <a:t> according to the desired probability distributions, but infeasible to obtain the distributions in </a:t>
+            </a:r>
+            <a:r>
+              <a:rPr lang="en-US" b="1" dirty="0"/>
+              <a:t>explicit form</a:t>
+            </a:r>
+            <a:r>
+              <a:rPr lang="en-US" dirty="0"/>
+              <a:t>.</a:t>
+            </a:r>
+          </a:p>
+          <a:p>
+            <a:r>
+              <a:rPr lang="en-US" dirty="0"/>
+              <a:t>Works only for episodic tasks</a:t>
+            </a:r>
+          </a:p>
+          <a:p>
+            <a:pPr lvl="1"/>
+            <a:r>
+              <a:rPr lang="en-US" dirty="0"/>
+              <a:t>Defined (bounded) returns</a:t>
+            </a:r>
+          </a:p>
+          <a:p>
+            <a:pPr lvl="1"/>
+            <a:r>
+              <a:rPr lang="en-US" dirty="0"/>
+              <a:t>Split infinite tasks (driving) into episodes.</a:t>
+            </a:r>
+          </a:p>
+          <a:p>
+            <a:pPr lvl="1"/>
+            <a:r>
+              <a:rPr lang="en-US" dirty="0"/>
+              <a:t>Policy and value are updated only at the end of the episode.</a:t>
+            </a:r>
+          </a:p>
+          <a:p>
+            <a:r>
+              <a:rPr lang="en-US" dirty="0"/>
+              <a:t>Average </a:t>
+            </a:r>
+            <a:r>
+              <a:rPr lang="en-US" b="1" dirty="0"/>
+              <a:t>final </a:t>
+            </a:r>
+            <a:r>
+              <a:rPr lang="en-US" dirty="0"/>
+              <a:t>returns</a:t>
+            </a:r>
+          </a:p>
+        </p:txBody>
+      </p:sp>
+      <p:sp>
+        <p:nvSpPr>
+          <p:cNvPr id="4" name="Footer Placeholder 3">
+            <a:extLst>
+              <a:ext uri="{FF2B5EF4-FFF2-40B4-BE49-F238E27FC236}">
+                <a16:creationId xmlns:a16="http://schemas.microsoft.com/office/drawing/2014/main" id="{2DA7F823-0426-E918-17BD-DBD8368590E2}"/>
+              </a:ext>
+            </a:extLst>
+          </p:cNvPr>
+          <p:cNvSpPr>
+            <a:spLocks noGrp="1"/>
+          </p:cNvSpPr>
+          <p:nvPr>
+            <p:ph type="ftr" sz="quarter" idx="11"/>
+          </p:nvPr>
+        </p:nvSpPr>
+        <p:spPr/>
+        <p:txBody>
+          <a:bodyPr/>
+          <a:lstStyle/>
+          <a:p>
+            <a:r>
+              <a:rPr lang="en-US"/>
+              <a:t>Davood Wadi</a:t>
+            </a:r>
+          </a:p>
+        </p:txBody>
+      </p:sp>
+      <p:sp>
+        <p:nvSpPr>
+          <p:cNvPr id="5" name="Slide Number Placeholder 4">
+            <a:extLst>
+              <a:ext uri="{FF2B5EF4-FFF2-40B4-BE49-F238E27FC236}">
+                <a16:creationId xmlns:a16="http://schemas.microsoft.com/office/drawing/2014/main" id="{131D5AD0-2245-FA23-5C59-4F3A7E4DB76A}"/>
+              </a:ext>
+            </a:extLst>
+          </p:cNvPr>
+          <p:cNvSpPr>
+            <a:spLocks noGrp="1"/>
+          </p:cNvSpPr>
+          <p:nvPr>
+            <p:ph type="sldNum" sz="quarter" idx="12"/>
+          </p:nvPr>
+        </p:nvSpPr>
+        <p:spPr/>
+        <p:txBody>
+          <a:bodyPr/>
+          <a:lstStyle/>
+          <a:p>
+            <a:fld id="{3675ED69-EEF9-2244-A839-9AD338E45078}" type="slidenum">
+              <a:rPr lang="en-US" smtClean="0"/>
+              <a:t>18</a:t>
+            </a:fld>
+            <a:endParaRPr lang="en-US"/>
+          </a:p>
+        </p:txBody>
+      </p:sp>
+      <p:sp>
+        <p:nvSpPr>
+          <p:cNvPr id="6" name="TextBox 5">
+            <a:extLst>
+              <a:ext uri="{FF2B5EF4-FFF2-40B4-BE49-F238E27FC236}">
+                <a16:creationId xmlns:a16="http://schemas.microsoft.com/office/drawing/2014/main" id="{EEA48DFD-6AB8-A329-09D3-2E9F047BF7EC}"/>
+              </a:ext>
+            </a:extLst>
+          </p:cNvPr>
+          <p:cNvSpPr txBox="1"/>
+          <p:nvPr/>
+        </p:nvSpPr>
+        <p:spPr>
+          <a:xfrm>
+            <a:off x="254000" y="6365875"/>
+            <a:ext cx="2593146" cy="369332"/>
+          </a:xfrm>
+          <a:prstGeom prst="rect">
+            <a:avLst/>
+          </a:prstGeom>
+          <a:noFill/>
+        </p:spPr>
+        <p:txBody>
+          <a:bodyPr wrap="none" rtlCol="0">
+            <a:spAutoFit/>
+          </a:bodyPr>
+          <a:lstStyle/>
+          <a:p>
+            <a:r>
+              <a:rPr lang="en-US" dirty="0"/>
+              <a:t>Source: Richard S. Sutton.</a:t>
+            </a:r>
+          </a:p>
+        </p:txBody>
+      </p:sp>
+    </p:spTree>
+    <p:extLst>
+      <p:ext uri="{BB962C8B-B14F-4D97-AF65-F5344CB8AC3E}">
+        <p14:creationId xmlns:p14="http://schemas.microsoft.com/office/powerpoint/2010/main" val="1150374027"/>
+      </p:ext>
+    </p:extLst>
+  </p:cSld>
+  <p:clrMapOvr>
+    <a:masterClrMapping/>
+  </p:clrMapOvr>
+</p:sld>
+</file>
+
+<file path=ppt/slides/slide19.xml><?xml version="1.0" encoding="utf-8"?>
+<p:sld xmlns:a="http://schemas.openxmlformats.org/drawingml/2006/main" xmlns:r="http://schemas.openxmlformats.org/officeDocument/2006/relationships" xmlns:p="http://schemas.openxmlformats.org/presentationml/2006/main">
+  <p:cSld>
+    <p:spTree>
+      <p:nvGrpSpPr>
+        <p:cNvPr id="1" name=""/>
+        <p:cNvGrpSpPr/>
+        <p:nvPr/>
+      </p:nvGrpSpPr>
+      <p:grpSpPr>
+        <a:xfrm>
+          <a:off x="0" y="0"/>
+          <a:ext cx="0" cy="0"/>
+          <a:chOff x="0" y="0"/>
+          <a:chExt cx="0" cy="0"/>
+        </a:xfrm>
+      </p:grpSpPr>
+      <p:sp>
+        <p:nvSpPr>
+          <p:cNvPr id="2" name="Title 1">
+            <a:extLst>
+              <a:ext uri="{FF2B5EF4-FFF2-40B4-BE49-F238E27FC236}">
+                <a16:creationId xmlns:a16="http://schemas.microsoft.com/office/drawing/2014/main" id="{8EEA3843-147B-83B3-CDB1-5E91933C309B}"/>
+              </a:ext>
+            </a:extLst>
+          </p:cNvPr>
+          <p:cNvSpPr>
+            <a:spLocks noGrp="1"/>
+          </p:cNvSpPr>
+          <p:nvPr>
+            <p:ph type="title"/>
+          </p:nvPr>
+        </p:nvSpPr>
+        <p:spPr/>
+        <p:txBody>
+          <a:bodyPr/>
+          <a:lstStyle/>
+          <a:p>
+            <a:r>
+              <a:rPr lang="en-US" dirty="0"/>
+              <a:t>MC vs. DP</a:t>
+            </a:r>
+          </a:p>
+        </p:txBody>
+      </p:sp>
+      <p:pic>
+        <p:nvPicPr>
+          <p:cNvPr id="6" name="Content Placeholder 5">
+            <a:extLst>
+              <a:ext uri="{FF2B5EF4-FFF2-40B4-BE49-F238E27FC236}">
+                <a16:creationId xmlns:a16="http://schemas.microsoft.com/office/drawing/2014/main" id="{F0CA9267-B2E4-371B-7104-6E6305860BD1}"/>
+              </a:ext>
+            </a:extLst>
+          </p:cNvPr>
+          <p:cNvPicPr>
+            <a:picLocks noGrp="1" noChangeAspect="1"/>
+          </p:cNvPicPr>
+          <p:nvPr>
+            <p:ph sz="half" idx="1"/>
+          </p:nvPr>
+        </p:nvPicPr>
+        <p:blipFill>
+          <a:blip r:embed="rId2"/>
+          <a:stretch>
+            <a:fillRect/>
+          </a:stretch>
+        </p:blipFill>
+        <p:spPr>
+          <a:xfrm>
+            <a:off x="838200" y="3688722"/>
+            <a:ext cx="5181600" cy="625143"/>
+          </a:xfrm>
+          <a:prstGeom prst="rect">
+            <a:avLst/>
+          </a:prstGeom>
+        </p:spPr>
+      </p:pic>
+      <p:sp>
+        <p:nvSpPr>
+          <p:cNvPr id="7" name="Content Placeholder 6">
+            <a:extLst>
+              <a:ext uri="{FF2B5EF4-FFF2-40B4-BE49-F238E27FC236}">
+                <a16:creationId xmlns:a16="http://schemas.microsoft.com/office/drawing/2014/main" id="{823D82DC-A1D6-D19C-94AB-E5E281D5A042}"/>
+              </a:ext>
+            </a:extLst>
+          </p:cNvPr>
+          <p:cNvSpPr>
+            <a:spLocks noGrp="1"/>
+          </p:cNvSpPr>
+          <p:nvPr>
+            <p:ph sz="half" idx="2"/>
+          </p:nvPr>
+        </p:nvSpPr>
+        <p:spPr/>
+        <p:txBody>
+          <a:bodyPr/>
+          <a:lstStyle/>
+          <a:p>
+            <a:r>
+              <a:rPr lang="en-US" dirty="0"/>
+              <a:t>Monte Carlo estimates 6.3</a:t>
+            </a:r>
+          </a:p>
+          <a:p>
+            <a:r>
+              <a:rPr lang="en-US" dirty="0"/>
+              <a:t>DP estimates 6.4</a:t>
+            </a:r>
+          </a:p>
+        </p:txBody>
+      </p:sp>
+      <p:sp>
+        <p:nvSpPr>
+          <p:cNvPr id="4" name="Footer Placeholder 3">
+            <a:extLst>
+              <a:ext uri="{FF2B5EF4-FFF2-40B4-BE49-F238E27FC236}">
+                <a16:creationId xmlns:a16="http://schemas.microsoft.com/office/drawing/2014/main" id="{145ACEAF-13C3-F616-5C16-FE8D5AE26D97}"/>
+              </a:ext>
+            </a:extLst>
+          </p:cNvPr>
+          <p:cNvSpPr>
+            <a:spLocks noGrp="1"/>
+          </p:cNvSpPr>
+          <p:nvPr>
+            <p:ph type="ftr" sz="quarter" idx="11"/>
+          </p:nvPr>
+        </p:nvSpPr>
+        <p:spPr/>
+        <p:txBody>
+          <a:bodyPr/>
+          <a:lstStyle/>
+          <a:p>
+            <a:r>
+              <a:rPr lang="en-US"/>
+              <a:t>Davood Wadi</a:t>
+            </a:r>
+          </a:p>
+        </p:txBody>
+      </p:sp>
+      <p:sp>
+        <p:nvSpPr>
+          <p:cNvPr id="5" name="Slide Number Placeholder 4">
+            <a:extLst>
+              <a:ext uri="{FF2B5EF4-FFF2-40B4-BE49-F238E27FC236}">
+                <a16:creationId xmlns:a16="http://schemas.microsoft.com/office/drawing/2014/main" id="{1E3866CE-7C78-EE2B-8226-1645001EE3AB}"/>
+              </a:ext>
+            </a:extLst>
+          </p:cNvPr>
+          <p:cNvSpPr>
+            <a:spLocks noGrp="1"/>
+          </p:cNvSpPr>
+          <p:nvPr>
+            <p:ph type="sldNum" sz="quarter" idx="12"/>
+          </p:nvPr>
+        </p:nvSpPr>
+        <p:spPr/>
+        <p:txBody>
+          <a:bodyPr/>
+          <a:lstStyle/>
+          <a:p>
+            <a:fld id="{3675ED69-EEF9-2244-A839-9AD338E45078}" type="slidenum">
+              <a:rPr lang="en-US" smtClean="0"/>
+              <a:t>19</a:t>
+            </a:fld>
+            <a:endParaRPr lang="en-US"/>
+          </a:p>
+        </p:txBody>
+      </p:sp>
+    </p:spTree>
+    <p:extLst>
+      <p:ext uri="{BB962C8B-B14F-4D97-AF65-F5344CB8AC3E}">
+        <p14:creationId xmlns:p14="http://schemas.microsoft.com/office/powerpoint/2010/main" val="3154203009"/>
       </p:ext>
     </p:extLst>
   </p:cSld>
@@ -4751,6 +6882,1729 @@
     <p:extLst>
       <p:ext uri="{BB962C8B-B14F-4D97-AF65-F5344CB8AC3E}">
         <p14:creationId xmlns:p14="http://schemas.microsoft.com/office/powerpoint/2010/main" val="3582385373"/>
+      </p:ext>
+    </p:extLst>
+  </p:cSld>
+  <p:clrMapOvr>
+    <a:masterClrMapping/>
+  </p:clrMapOvr>
+</p:sld>
+</file>
+
+<file path=ppt/slides/slide20.xml><?xml version="1.0" encoding="utf-8"?>
+<p:sld xmlns:a="http://schemas.openxmlformats.org/drawingml/2006/main" xmlns:r="http://schemas.openxmlformats.org/officeDocument/2006/relationships" xmlns:p="http://schemas.openxmlformats.org/presentationml/2006/main">
+  <p:cSld>
+    <p:spTree>
+      <p:nvGrpSpPr>
+        <p:cNvPr id="1" name=""/>
+        <p:cNvGrpSpPr/>
+        <p:nvPr/>
+      </p:nvGrpSpPr>
+      <p:grpSpPr>
+        <a:xfrm>
+          <a:off x="0" y="0"/>
+          <a:ext cx="0" cy="0"/>
+          <a:chOff x="0" y="0"/>
+          <a:chExt cx="0" cy="0"/>
+        </a:xfrm>
+      </p:grpSpPr>
+      <p:sp>
+        <p:nvSpPr>
+          <p:cNvPr id="2" name="Title 1">
+            <a:extLst>
+              <a:ext uri="{FF2B5EF4-FFF2-40B4-BE49-F238E27FC236}">
+                <a16:creationId xmlns:a16="http://schemas.microsoft.com/office/drawing/2014/main" id="{97A11A6B-6FEF-FF7F-68AF-E58748F6B610}"/>
+              </a:ext>
+            </a:extLst>
+          </p:cNvPr>
+          <p:cNvSpPr>
+            <a:spLocks noGrp="1"/>
+          </p:cNvSpPr>
+          <p:nvPr>
+            <p:ph type="title"/>
+          </p:nvPr>
+        </p:nvSpPr>
+        <p:spPr/>
+        <p:txBody>
+          <a:bodyPr/>
+          <a:lstStyle/>
+          <a:p>
+            <a:r>
+              <a:rPr lang="en-US" dirty="0"/>
+              <a:t>Monte Carlo Prediction</a:t>
+            </a:r>
+          </a:p>
+        </p:txBody>
+      </p:sp>
+      <p:sp>
+        <p:nvSpPr>
+          <p:cNvPr id="3" name="Content Placeholder 2">
+            <a:extLst>
+              <a:ext uri="{FF2B5EF4-FFF2-40B4-BE49-F238E27FC236}">
+                <a16:creationId xmlns:a16="http://schemas.microsoft.com/office/drawing/2014/main" id="{FE44838B-1AD0-23DF-11F7-1BC42D68B32A}"/>
+              </a:ext>
+            </a:extLst>
+          </p:cNvPr>
+          <p:cNvSpPr>
+            <a:spLocks noGrp="1"/>
+          </p:cNvSpPr>
+          <p:nvPr>
+            <p:ph idx="1"/>
+          </p:nvPr>
+        </p:nvSpPr>
+        <p:spPr/>
+        <p:txBody>
+          <a:bodyPr/>
+          <a:lstStyle/>
+          <a:p>
+            <a:r>
+              <a:rPr lang="en-US" dirty="0"/>
+              <a:t>Learn state-value function of a given policy</a:t>
+            </a:r>
+          </a:p>
+          <a:p>
+            <a:r>
+              <a:rPr lang="en-US" dirty="0"/>
+              <a:t>We defined value as expected </a:t>
+            </a:r>
+            <a:r>
+              <a:rPr lang="en-US" b="1" dirty="0"/>
+              <a:t>returns </a:t>
+            </a:r>
+            <a:r>
+              <a:rPr lang="en-US" dirty="0"/>
+              <a:t>from state S.</a:t>
+            </a:r>
+          </a:p>
+          <a:p>
+            <a:pPr lvl="1"/>
+            <a:r>
+              <a:rPr lang="en-US" dirty="0"/>
+              <a:t>Returns: cumulative discounted rewards, or </a:t>
+            </a:r>
+            <a:r>
+              <a:rPr lang="en-US" b="1" dirty="0"/>
+              <a:t>values</a:t>
+            </a:r>
+          </a:p>
+          <a:p>
+            <a:r>
+              <a:rPr lang="en-US" dirty="0"/>
+              <a:t>To estimate value, average all rewards received after visiting state S.	</a:t>
+            </a:r>
+          </a:p>
+          <a:p>
+            <a:endParaRPr lang="en-US" dirty="0"/>
+          </a:p>
+        </p:txBody>
+      </p:sp>
+      <p:sp>
+        <p:nvSpPr>
+          <p:cNvPr id="4" name="Footer Placeholder 3">
+            <a:extLst>
+              <a:ext uri="{FF2B5EF4-FFF2-40B4-BE49-F238E27FC236}">
+                <a16:creationId xmlns:a16="http://schemas.microsoft.com/office/drawing/2014/main" id="{BAFCDDE4-C1CC-69C4-F4C0-C3200FDA0181}"/>
+              </a:ext>
+            </a:extLst>
+          </p:cNvPr>
+          <p:cNvSpPr>
+            <a:spLocks noGrp="1"/>
+          </p:cNvSpPr>
+          <p:nvPr>
+            <p:ph type="ftr" sz="quarter" idx="11"/>
+          </p:nvPr>
+        </p:nvSpPr>
+        <p:spPr/>
+        <p:txBody>
+          <a:bodyPr/>
+          <a:lstStyle/>
+          <a:p>
+            <a:r>
+              <a:rPr lang="en-US"/>
+              <a:t>Davood Wadi</a:t>
+            </a:r>
+          </a:p>
+        </p:txBody>
+      </p:sp>
+      <p:sp>
+        <p:nvSpPr>
+          <p:cNvPr id="5" name="Slide Number Placeholder 4">
+            <a:extLst>
+              <a:ext uri="{FF2B5EF4-FFF2-40B4-BE49-F238E27FC236}">
+                <a16:creationId xmlns:a16="http://schemas.microsoft.com/office/drawing/2014/main" id="{ED3528F4-759B-54D8-E969-14267255A350}"/>
+              </a:ext>
+            </a:extLst>
+          </p:cNvPr>
+          <p:cNvSpPr>
+            <a:spLocks noGrp="1"/>
+          </p:cNvSpPr>
+          <p:nvPr>
+            <p:ph type="sldNum" sz="quarter" idx="12"/>
+          </p:nvPr>
+        </p:nvSpPr>
+        <p:spPr/>
+        <p:txBody>
+          <a:bodyPr/>
+          <a:lstStyle/>
+          <a:p>
+            <a:fld id="{3675ED69-EEF9-2244-A839-9AD338E45078}" type="slidenum">
+              <a:rPr lang="en-US" smtClean="0"/>
+              <a:t>20</a:t>
+            </a:fld>
+            <a:endParaRPr lang="en-US"/>
+          </a:p>
+        </p:txBody>
+      </p:sp>
+    </p:spTree>
+    <p:extLst>
+      <p:ext uri="{BB962C8B-B14F-4D97-AF65-F5344CB8AC3E}">
+        <p14:creationId xmlns:p14="http://schemas.microsoft.com/office/powerpoint/2010/main" val="1962963507"/>
+      </p:ext>
+    </p:extLst>
+  </p:cSld>
+  <p:clrMapOvr>
+    <a:masterClrMapping/>
+  </p:clrMapOvr>
+</p:sld>
+</file>
+
+<file path=ppt/slides/slide21.xml><?xml version="1.0" encoding="utf-8"?>
+<p:sld xmlns:a="http://schemas.openxmlformats.org/drawingml/2006/main" xmlns:r="http://schemas.openxmlformats.org/officeDocument/2006/relationships" xmlns:p="http://schemas.openxmlformats.org/presentationml/2006/main">
+  <p:cSld>
+    <p:spTree>
+      <p:nvGrpSpPr>
+        <p:cNvPr id="1" name=""/>
+        <p:cNvGrpSpPr/>
+        <p:nvPr/>
+      </p:nvGrpSpPr>
+      <p:grpSpPr>
+        <a:xfrm>
+          <a:off x="0" y="0"/>
+          <a:ext cx="0" cy="0"/>
+          <a:chOff x="0" y="0"/>
+          <a:chExt cx="0" cy="0"/>
+        </a:xfrm>
+      </p:grpSpPr>
+      <p:sp>
+        <p:nvSpPr>
+          <p:cNvPr id="2" name="Title 1">
+            <a:extLst>
+              <a:ext uri="{FF2B5EF4-FFF2-40B4-BE49-F238E27FC236}">
+                <a16:creationId xmlns:a16="http://schemas.microsoft.com/office/drawing/2014/main" id="{A0428FC5-A256-9718-EE03-6C3ECA26E49E}"/>
+              </a:ext>
+            </a:extLst>
+          </p:cNvPr>
+          <p:cNvSpPr>
+            <a:spLocks noGrp="1"/>
+          </p:cNvSpPr>
+          <p:nvPr>
+            <p:ph type="title"/>
+          </p:nvPr>
+        </p:nvSpPr>
+        <p:spPr/>
+        <p:txBody>
+          <a:bodyPr/>
+          <a:lstStyle/>
+          <a:p>
+            <a:r>
+              <a:rPr lang="en-US" dirty="0"/>
+              <a:t>Monte Carlo Prediction</a:t>
+            </a:r>
+          </a:p>
+        </p:txBody>
+      </p:sp>
+      <p:sp>
+        <p:nvSpPr>
+          <p:cNvPr id="3" name="Content Placeholder 2">
+            <a:extLst>
+              <a:ext uri="{FF2B5EF4-FFF2-40B4-BE49-F238E27FC236}">
+                <a16:creationId xmlns:a16="http://schemas.microsoft.com/office/drawing/2014/main" id="{3D4741E7-C4E2-A5F4-5B54-7D3460769ADE}"/>
+              </a:ext>
+            </a:extLst>
+          </p:cNvPr>
+          <p:cNvSpPr>
+            <a:spLocks noGrp="1"/>
+          </p:cNvSpPr>
+          <p:nvPr>
+            <p:ph idx="1"/>
+          </p:nvPr>
+        </p:nvSpPr>
+        <p:spPr/>
+        <p:txBody>
+          <a:bodyPr/>
+          <a:lstStyle/>
+          <a:p>
+            <a:r>
+              <a:rPr lang="en-US" dirty="0"/>
+              <a:t>Each S can be visited multiple times in an episode.</a:t>
+            </a:r>
+          </a:p>
+          <a:p>
+            <a:r>
+              <a:rPr lang="en-US" dirty="0"/>
+              <a:t>Monte Carlo Exploring Starts</a:t>
+            </a:r>
+          </a:p>
+          <a:p>
+            <a:r>
+              <a:rPr lang="en-US" dirty="0"/>
+              <a:t>First-visit Monte Carlo:</a:t>
+            </a:r>
+          </a:p>
+          <a:p>
+            <a:pPr lvl="1"/>
+            <a:r>
+              <a:rPr lang="en-US" dirty="0"/>
+              <a:t>V = Average return after the first visit to S</a:t>
+            </a:r>
+          </a:p>
+          <a:p>
+            <a:pPr lvl="1"/>
+            <a:r>
+              <a:rPr lang="en-US" dirty="0"/>
+              <a:t>More researched method</a:t>
+            </a:r>
+          </a:p>
+          <a:p>
+            <a:pPr lvl="1"/>
+            <a:r>
+              <a:rPr lang="en-US" dirty="0"/>
+              <a:t>Dates back to 1940s</a:t>
+            </a:r>
+          </a:p>
+          <a:p>
+            <a:r>
+              <a:rPr lang="en-US" dirty="0"/>
+              <a:t>Every-visit Monte Carlo:</a:t>
+            </a:r>
+          </a:p>
+          <a:p>
+            <a:pPr lvl="1"/>
+            <a:r>
+              <a:rPr lang="en-US" dirty="0"/>
+              <a:t>V = Average return after all visits to S</a:t>
+            </a:r>
+          </a:p>
+        </p:txBody>
+      </p:sp>
+      <p:sp>
+        <p:nvSpPr>
+          <p:cNvPr id="4" name="Footer Placeholder 3">
+            <a:extLst>
+              <a:ext uri="{FF2B5EF4-FFF2-40B4-BE49-F238E27FC236}">
+                <a16:creationId xmlns:a16="http://schemas.microsoft.com/office/drawing/2014/main" id="{1A27F2FC-8DDC-BB74-6716-C90C871B7DD1}"/>
+              </a:ext>
+            </a:extLst>
+          </p:cNvPr>
+          <p:cNvSpPr>
+            <a:spLocks noGrp="1"/>
+          </p:cNvSpPr>
+          <p:nvPr>
+            <p:ph type="ftr" sz="quarter" idx="11"/>
+          </p:nvPr>
+        </p:nvSpPr>
+        <p:spPr/>
+        <p:txBody>
+          <a:bodyPr/>
+          <a:lstStyle/>
+          <a:p>
+            <a:r>
+              <a:rPr lang="en-US"/>
+              <a:t>Davood Wadi</a:t>
+            </a:r>
+          </a:p>
+        </p:txBody>
+      </p:sp>
+      <p:sp>
+        <p:nvSpPr>
+          <p:cNvPr id="5" name="Slide Number Placeholder 4">
+            <a:extLst>
+              <a:ext uri="{FF2B5EF4-FFF2-40B4-BE49-F238E27FC236}">
+                <a16:creationId xmlns:a16="http://schemas.microsoft.com/office/drawing/2014/main" id="{7E1C7765-E17C-CC53-D2F5-DCC470B1BA1A}"/>
+              </a:ext>
+            </a:extLst>
+          </p:cNvPr>
+          <p:cNvSpPr>
+            <a:spLocks noGrp="1"/>
+          </p:cNvSpPr>
+          <p:nvPr>
+            <p:ph type="sldNum" sz="quarter" idx="12"/>
+          </p:nvPr>
+        </p:nvSpPr>
+        <p:spPr/>
+        <p:txBody>
+          <a:bodyPr/>
+          <a:lstStyle/>
+          <a:p>
+            <a:fld id="{3675ED69-EEF9-2244-A839-9AD338E45078}" type="slidenum">
+              <a:rPr lang="en-US" smtClean="0"/>
+              <a:t>21</a:t>
+            </a:fld>
+            <a:endParaRPr lang="en-US"/>
+          </a:p>
+        </p:txBody>
+      </p:sp>
+    </p:spTree>
+    <p:extLst>
+      <p:ext uri="{BB962C8B-B14F-4D97-AF65-F5344CB8AC3E}">
+        <p14:creationId xmlns:p14="http://schemas.microsoft.com/office/powerpoint/2010/main" val="821259771"/>
+      </p:ext>
+    </p:extLst>
+  </p:cSld>
+  <p:clrMapOvr>
+    <a:masterClrMapping/>
+  </p:clrMapOvr>
+</p:sld>
+</file>
+
+<file path=ppt/slides/slide22.xml><?xml version="1.0" encoding="utf-8"?>
+<p:sld xmlns:a="http://schemas.openxmlformats.org/drawingml/2006/main" xmlns:r="http://schemas.openxmlformats.org/officeDocument/2006/relationships" xmlns:p="http://schemas.openxmlformats.org/presentationml/2006/main">
+  <p:cSld>
+    <p:spTree>
+      <p:nvGrpSpPr>
+        <p:cNvPr id="1" name=""/>
+        <p:cNvGrpSpPr/>
+        <p:nvPr/>
+      </p:nvGrpSpPr>
+      <p:grpSpPr>
+        <a:xfrm>
+          <a:off x="0" y="0"/>
+          <a:ext cx="0" cy="0"/>
+          <a:chOff x="0" y="0"/>
+          <a:chExt cx="0" cy="0"/>
+        </a:xfrm>
+      </p:grpSpPr>
+      <p:sp>
+        <p:nvSpPr>
+          <p:cNvPr id="7" name="Title 6">
+            <a:extLst>
+              <a:ext uri="{FF2B5EF4-FFF2-40B4-BE49-F238E27FC236}">
+                <a16:creationId xmlns:a16="http://schemas.microsoft.com/office/drawing/2014/main" id="{29DFED1E-5E70-FE65-78B9-9549385E8AB1}"/>
+              </a:ext>
+            </a:extLst>
+          </p:cNvPr>
+          <p:cNvSpPr>
+            <a:spLocks noGrp="1"/>
+          </p:cNvSpPr>
+          <p:nvPr>
+            <p:ph type="title"/>
+          </p:nvPr>
+        </p:nvSpPr>
+        <p:spPr/>
+        <p:txBody>
+          <a:bodyPr/>
+          <a:lstStyle/>
+          <a:p>
+            <a:r>
+              <a:rPr lang="en-US" dirty="0"/>
+              <a:t>MC ES</a:t>
+            </a:r>
+          </a:p>
+        </p:txBody>
+      </p:sp>
+      <p:pic>
+        <p:nvPicPr>
+          <p:cNvPr id="9" name="Content Placeholder 8">
+            <a:extLst>
+              <a:ext uri="{FF2B5EF4-FFF2-40B4-BE49-F238E27FC236}">
+                <a16:creationId xmlns:a16="http://schemas.microsoft.com/office/drawing/2014/main" id="{48D2D82A-14EB-A1EE-3360-063A589C0B87}"/>
+              </a:ext>
+            </a:extLst>
+          </p:cNvPr>
+          <p:cNvPicPr>
+            <a:picLocks noGrp="1" noChangeAspect="1"/>
+          </p:cNvPicPr>
+          <p:nvPr>
+            <p:ph idx="1"/>
+          </p:nvPr>
+        </p:nvPicPr>
+        <p:blipFill>
+          <a:blip r:embed="rId2"/>
+          <a:stretch>
+            <a:fillRect/>
+          </a:stretch>
+        </p:blipFill>
+        <p:spPr>
+          <a:xfrm>
+            <a:off x="2264431" y="1825625"/>
+            <a:ext cx="7663138" cy="4351338"/>
+          </a:xfrm>
+          <a:prstGeom prst="rect">
+            <a:avLst/>
+          </a:prstGeom>
+        </p:spPr>
+      </p:pic>
+      <p:sp>
+        <p:nvSpPr>
+          <p:cNvPr id="5" name="Footer Placeholder 4">
+            <a:extLst>
+              <a:ext uri="{FF2B5EF4-FFF2-40B4-BE49-F238E27FC236}">
+                <a16:creationId xmlns:a16="http://schemas.microsoft.com/office/drawing/2014/main" id="{211C7672-3A7A-D724-D0EA-BFD36190A772}"/>
+              </a:ext>
+            </a:extLst>
+          </p:cNvPr>
+          <p:cNvSpPr>
+            <a:spLocks noGrp="1"/>
+          </p:cNvSpPr>
+          <p:nvPr>
+            <p:ph type="ftr" sz="quarter" idx="11"/>
+          </p:nvPr>
+        </p:nvSpPr>
+        <p:spPr/>
+        <p:txBody>
+          <a:bodyPr/>
+          <a:lstStyle/>
+          <a:p>
+            <a:r>
+              <a:rPr lang="en-US"/>
+              <a:t>Davood Wadi</a:t>
+            </a:r>
+          </a:p>
+        </p:txBody>
+      </p:sp>
+      <p:sp>
+        <p:nvSpPr>
+          <p:cNvPr id="6" name="Slide Number Placeholder 5">
+            <a:extLst>
+              <a:ext uri="{FF2B5EF4-FFF2-40B4-BE49-F238E27FC236}">
+                <a16:creationId xmlns:a16="http://schemas.microsoft.com/office/drawing/2014/main" id="{605110C4-1908-3D99-6068-0300CDA1BF56}"/>
+              </a:ext>
+            </a:extLst>
+          </p:cNvPr>
+          <p:cNvSpPr>
+            <a:spLocks noGrp="1"/>
+          </p:cNvSpPr>
+          <p:nvPr>
+            <p:ph type="sldNum" sz="quarter" idx="12"/>
+          </p:nvPr>
+        </p:nvSpPr>
+        <p:spPr/>
+        <p:txBody>
+          <a:bodyPr/>
+          <a:lstStyle/>
+          <a:p>
+            <a:fld id="{3675ED69-EEF9-2244-A839-9AD338E45078}" type="slidenum">
+              <a:rPr lang="en-US" smtClean="0"/>
+              <a:t>22</a:t>
+            </a:fld>
+            <a:endParaRPr lang="en-US"/>
+          </a:p>
+        </p:txBody>
+      </p:sp>
+    </p:spTree>
+    <p:extLst>
+      <p:ext uri="{BB962C8B-B14F-4D97-AF65-F5344CB8AC3E}">
+        <p14:creationId xmlns:p14="http://schemas.microsoft.com/office/powerpoint/2010/main" val="3541845492"/>
+      </p:ext>
+    </p:extLst>
+  </p:cSld>
+  <p:clrMapOvr>
+    <a:masterClrMapping/>
+  </p:clrMapOvr>
+</p:sld>
+</file>
+
+<file path=ppt/slides/slide23.xml><?xml version="1.0" encoding="utf-8"?>
+<p:sld xmlns:a="http://schemas.openxmlformats.org/drawingml/2006/main" xmlns:r="http://schemas.openxmlformats.org/officeDocument/2006/relationships" xmlns:p="http://schemas.openxmlformats.org/presentationml/2006/main">
+  <p:cSld>
+    <p:spTree>
+      <p:nvGrpSpPr>
+        <p:cNvPr id="1" name=""/>
+        <p:cNvGrpSpPr/>
+        <p:nvPr/>
+      </p:nvGrpSpPr>
+      <p:grpSpPr>
+        <a:xfrm>
+          <a:off x="0" y="0"/>
+          <a:ext cx="0" cy="0"/>
+          <a:chOff x="0" y="0"/>
+          <a:chExt cx="0" cy="0"/>
+        </a:xfrm>
+      </p:grpSpPr>
+      <p:sp>
+        <p:nvSpPr>
+          <p:cNvPr id="2" name="Title 1">
+            <a:extLst>
+              <a:ext uri="{FF2B5EF4-FFF2-40B4-BE49-F238E27FC236}">
+                <a16:creationId xmlns:a16="http://schemas.microsoft.com/office/drawing/2014/main" id="{5A424800-E4F2-AC30-B2D7-05C7CE5EEAE5}"/>
+              </a:ext>
+            </a:extLst>
+          </p:cNvPr>
+          <p:cNvSpPr>
+            <a:spLocks noGrp="1"/>
+          </p:cNvSpPr>
+          <p:nvPr>
+            <p:ph type="title"/>
+          </p:nvPr>
+        </p:nvSpPr>
+        <p:spPr/>
+        <p:txBody>
+          <a:bodyPr/>
+          <a:lstStyle/>
+          <a:p>
+            <a:r>
+              <a:rPr lang="en-US" dirty="0"/>
+              <a:t>Blackjack MC ES</a:t>
+            </a:r>
+          </a:p>
+        </p:txBody>
+      </p:sp>
+      <p:pic>
+        <p:nvPicPr>
+          <p:cNvPr id="6" name="Content Placeholder 5">
+            <a:extLst>
+              <a:ext uri="{FF2B5EF4-FFF2-40B4-BE49-F238E27FC236}">
+                <a16:creationId xmlns:a16="http://schemas.microsoft.com/office/drawing/2014/main" id="{E397364B-5B24-1EF1-5837-48FB2D9B01FA}"/>
+              </a:ext>
+            </a:extLst>
+          </p:cNvPr>
+          <p:cNvPicPr>
+            <a:picLocks noGrp="1" noChangeAspect="1"/>
+          </p:cNvPicPr>
+          <p:nvPr>
+            <p:ph idx="1"/>
+          </p:nvPr>
+        </p:nvPicPr>
+        <p:blipFill>
+          <a:blip r:embed="rId2"/>
+          <a:stretch>
+            <a:fillRect/>
+          </a:stretch>
+        </p:blipFill>
+        <p:spPr>
+          <a:xfrm>
+            <a:off x="3017761" y="1825625"/>
+            <a:ext cx="6156478" cy="4351338"/>
+          </a:xfrm>
+          <a:prstGeom prst="rect">
+            <a:avLst/>
+          </a:prstGeom>
+        </p:spPr>
+      </p:pic>
+      <p:sp>
+        <p:nvSpPr>
+          <p:cNvPr id="4" name="Footer Placeholder 3">
+            <a:extLst>
+              <a:ext uri="{FF2B5EF4-FFF2-40B4-BE49-F238E27FC236}">
+                <a16:creationId xmlns:a16="http://schemas.microsoft.com/office/drawing/2014/main" id="{FE76825E-5CD1-C5AF-5903-5D101EFD5727}"/>
+              </a:ext>
+            </a:extLst>
+          </p:cNvPr>
+          <p:cNvSpPr>
+            <a:spLocks noGrp="1"/>
+          </p:cNvSpPr>
+          <p:nvPr>
+            <p:ph type="ftr" sz="quarter" idx="11"/>
+          </p:nvPr>
+        </p:nvSpPr>
+        <p:spPr/>
+        <p:txBody>
+          <a:bodyPr/>
+          <a:lstStyle/>
+          <a:p>
+            <a:r>
+              <a:rPr lang="en-US"/>
+              <a:t>Davood Wadi</a:t>
+            </a:r>
+          </a:p>
+        </p:txBody>
+      </p:sp>
+      <p:sp>
+        <p:nvSpPr>
+          <p:cNvPr id="5" name="Slide Number Placeholder 4">
+            <a:extLst>
+              <a:ext uri="{FF2B5EF4-FFF2-40B4-BE49-F238E27FC236}">
+                <a16:creationId xmlns:a16="http://schemas.microsoft.com/office/drawing/2014/main" id="{E803E0D3-0C93-D2D5-D3F6-BB44F5EABC8E}"/>
+              </a:ext>
+            </a:extLst>
+          </p:cNvPr>
+          <p:cNvSpPr>
+            <a:spLocks noGrp="1"/>
+          </p:cNvSpPr>
+          <p:nvPr>
+            <p:ph type="sldNum" sz="quarter" idx="12"/>
+          </p:nvPr>
+        </p:nvSpPr>
+        <p:spPr/>
+        <p:txBody>
+          <a:bodyPr/>
+          <a:lstStyle/>
+          <a:p>
+            <a:fld id="{3675ED69-EEF9-2244-A839-9AD338E45078}" type="slidenum">
+              <a:rPr lang="en-US" smtClean="0"/>
+              <a:t>23</a:t>
+            </a:fld>
+            <a:endParaRPr lang="en-US"/>
+          </a:p>
+        </p:txBody>
+      </p:sp>
+    </p:spTree>
+    <p:extLst>
+      <p:ext uri="{BB962C8B-B14F-4D97-AF65-F5344CB8AC3E}">
+        <p14:creationId xmlns:p14="http://schemas.microsoft.com/office/powerpoint/2010/main" val="3842994399"/>
+      </p:ext>
+    </p:extLst>
+  </p:cSld>
+  <p:clrMapOvr>
+    <a:masterClrMapping/>
+  </p:clrMapOvr>
+</p:sld>
+</file>
+
+<file path=ppt/slides/slide24.xml><?xml version="1.0" encoding="utf-8"?>
+<p:sld xmlns:a="http://schemas.openxmlformats.org/drawingml/2006/main" xmlns:r="http://schemas.openxmlformats.org/officeDocument/2006/relationships" xmlns:p="http://schemas.openxmlformats.org/presentationml/2006/main">
+  <p:cSld>
+    <p:spTree>
+      <p:nvGrpSpPr>
+        <p:cNvPr id="1" name=""/>
+        <p:cNvGrpSpPr/>
+        <p:nvPr/>
+      </p:nvGrpSpPr>
+      <p:grpSpPr>
+        <a:xfrm>
+          <a:off x="0" y="0"/>
+          <a:ext cx="0" cy="0"/>
+          <a:chOff x="0" y="0"/>
+          <a:chExt cx="0" cy="0"/>
+        </a:xfrm>
+      </p:grpSpPr>
+      <p:sp>
+        <p:nvSpPr>
+          <p:cNvPr id="2" name="Title 1">
+            <a:extLst>
+              <a:ext uri="{FF2B5EF4-FFF2-40B4-BE49-F238E27FC236}">
+                <a16:creationId xmlns:a16="http://schemas.microsoft.com/office/drawing/2014/main" id="{9AEACA80-4AB4-3403-D1FC-1E233865E197}"/>
+              </a:ext>
+            </a:extLst>
+          </p:cNvPr>
+          <p:cNvSpPr>
+            <a:spLocks noGrp="1"/>
+          </p:cNvSpPr>
+          <p:nvPr>
+            <p:ph type="title"/>
+          </p:nvPr>
+        </p:nvSpPr>
+        <p:spPr/>
+        <p:txBody>
+          <a:bodyPr/>
+          <a:lstStyle/>
+          <a:p>
+            <a:r>
+              <a:rPr lang="en-US" dirty="0"/>
+              <a:t>First-Visit Monte Carlo</a:t>
+            </a:r>
+          </a:p>
+        </p:txBody>
+      </p:sp>
+      <p:sp>
+        <p:nvSpPr>
+          <p:cNvPr id="6" name="Content Placeholder 5">
+            <a:extLst>
+              <a:ext uri="{FF2B5EF4-FFF2-40B4-BE49-F238E27FC236}">
+                <a16:creationId xmlns:a16="http://schemas.microsoft.com/office/drawing/2014/main" id="{1854E67A-9251-8CAB-AAB2-996DA0E9EAC2}"/>
+              </a:ext>
+            </a:extLst>
+          </p:cNvPr>
+          <p:cNvSpPr>
+            <a:spLocks noGrp="1"/>
+          </p:cNvSpPr>
+          <p:nvPr>
+            <p:ph sz="half" idx="1"/>
+          </p:nvPr>
+        </p:nvSpPr>
+        <p:spPr/>
+        <p:txBody>
+          <a:bodyPr/>
+          <a:lstStyle/>
+          <a:p>
+            <a:r>
+              <a:rPr lang="en-US" dirty="0"/>
+              <a:t>Value iteration:</a:t>
+            </a:r>
+          </a:p>
+          <a:p>
+            <a:pPr lvl="1"/>
+            <a:r>
+              <a:rPr lang="en-US" dirty="0"/>
+              <a:t>Value is average returns of all the states you </a:t>
+            </a:r>
+            <a:r>
+              <a:rPr lang="en-US" b="1" dirty="0"/>
+              <a:t>can </a:t>
+            </a:r>
+            <a:r>
+              <a:rPr lang="en-US" dirty="0"/>
+              <a:t>go to.</a:t>
+            </a:r>
+          </a:p>
+          <a:p>
+            <a:r>
+              <a:rPr lang="en-US" dirty="0"/>
+              <a:t>First-visit Monte Carlo:</a:t>
+            </a:r>
+          </a:p>
+          <a:p>
+            <a:pPr lvl="1"/>
+            <a:r>
+              <a:rPr lang="en-US" dirty="0"/>
+              <a:t>Value is average returns of only the states you visited.</a:t>
+            </a:r>
+          </a:p>
+          <a:p>
+            <a:pPr lvl="1"/>
+            <a:r>
+              <a:rPr lang="en-US" dirty="0"/>
+              <a:t>Each return is </a:t>
+            </a:r>
+            <a:r>
+              <a:rPr lang="en-US" dirty="0" err="1"/>
+              <a:t>i.i.d.</a:t>
+            </a:r>
+            <a:r>
+              <a:rPr lang="en-US" dirty="0"/>
+              <a:t> sample from V</a:t>
+            </a:r>
+          </a:p>
+        </p:txBody>
+      </p:sp>
+      <p:pic>
+        <p:nvPicPr>
+          <p:cNvPr id="8" name="Content Placeholder 7">
+            <a:extLst>
+              <a:ext uri="{FF2B5EF4-FFF2-40B4-BE49-F238E27FC236}">
+                <a16:creationId xmlns:a16="http://schemas.microsoft.com/office/drawing/2014/main" id="{0EF6184C-40A0-7A8E-56D4-94C323CBBA89}"/>
+              </a:ext>
+            </a:extLst>
+          </p:cNvPr>
+          <p:cNvPicPr>
+            <a:picLocks noGrp="1" noChangeAspect="1"/>
+          </p:cNvPicPr>
+          <p:nvPr>
+            <p:ph sz="half" idx="2"/>
+          </p:nvPr>
+        </p:nvPicPr>
+        <p:blipFill>
+          <a:blip r:embed="rId2"/>
+          <a:stretch>
+            <a:fillRect/>
+          </a:stretch>
+        </p:blipFill>
+        <p:spPr>
+          <a:xfrm>
+            <a:off x="6172200" y="2690851"/>
+            <a:ext cx="5181600" cy="2620886"/>
+          </a:xfrm>
+          <a:prstGeom prst="rect">
+            <a:avLst/>
+          </a:prstGeom>
+        </p:spPr>
+      </p:pic>
+      <p:sp>
+        <p:nvSpPr>
+          <p:cNvPr id="4" name="Footer Placeholder 3">
+            <a:extLst>
+              <a:ext uri="{FF2B5EF4-FFF2-40B4-BE49-F238E27FC236}">
+                <a16:creationId xmlns:a16="http://schemas.microsoft.com/office/drawing/2014/main" id="{2F3FD19D-8C68-DFA6-5EB0-CF77D9D7BEE7}"/>
+              </a:ext>
+            </a:extLst>
+          </p:cNvPr>
+          <p:cNvSpPr>
+            <a:spLocks noGrp="1"/>
+          </p:cNvSpPr>
+          <p:nvPr>
+            <p:ph type="ftr" sz="quarter" idx="11"/>
+          </p:nvPr>
+        </p:nvSpPr>
+        <p:spPr/>
+        <p:txBody>
+          <a:bodyPr/>
+          <a:lstStyle/>
+          <a:p>
+            <a:r>
+              <a:rPr lang="en-US"/>
+              <a:t>Davood Wadi</a:t>
+            </a:r>
+          </a:p>
+        </p:txBody>
+      </p:sp>
+      <p:sp>
+        <p:nvSpPr>
+          <p:cNvPr id="5" name="Slide Number Placeholder 4">
+            <a:extLst>
+              <a:ext uri="{FF2B5EF4-FFF2-40B4-BE49-F238E27FC236}">
+                <a16:creationId xmlns:a16="http://schemas.microsoft.com/office/drawing/2014/main" id="{4C1E4D88-4CC8-6C9A-343C-04F4ED033AD8}"/>
+              </a:ext>
+            </a:extLst>
+          </p:cNvPr>
+          <p:cNvSpPr>
+            <a:spLocks noGrp="1"/>
+          </p:cNvSpPr>
+          <p:nvPr>
+            <p:ph type="sldNum" sz="quarter" idx="12"/>
+          </p:nvPr>
+        </p:nvSpPr>
+        <p:spPr/>
+        <p:txBody>
+          <a:bodyPr/>
+          <a:lstStyle/>
+          <a:p>
+            <a:fld id="{3675ED69-EEF9-2244-A839-9AD338E45078}" type="slidenum">
+              <a:rPr lang="en-US" smtClean="0"/>
+              <a:t>24</a:t>
+            </a:fld>
+            <a:endParaRPr lang="en-US"/>
+          </a:p>
+        </p:txBody>
+      </p:sp>
+    </p:spTree>
+    <p:extLst>
+      <p:ext uri="{BB962C8B-B14F-4D97-AF65-F5344CB8AC3E}">
+        <p14:creationId xmlns:p14="http://schemas.microsoft.com/office/powerpoint/2010/main" val="3748538172"/>
+      </p:ext>
+    </p:extLst>
+  </p:cSld>
+  <p:clrMapOvr>
+    <a:masterClrMapping/>
+  </p:clrMapOvr>
+</p:sld>
+</file>
+
+<file path=ppt/slides/slide25.xml><?xml version="1.0" encoding="utf-8"?>
+<p:sld xmlns:a="http://schemas.openxmlformats.org/drawingml/2006/main" xmlns:r="http://schemas.openxmlformats.org/officeDocument/2006/relationships" xmlns:p="http://schemas.openxmlformats.org/presentationml/2006/main">
+  <p:cSld>
+    <p:spTree>
+      <p:nvGrpSpPr>
+        <p:cNvPr id="1" name=""/>
+        <p:cNvGrpSpPr/>
+        <p:nvPr/>
+      </p:nvGrpSpPr>
+      <p:grpSpPr>
+        <a:xfrm>
+          <a:off x="0" y="0"/>
+          <a:ext cx="0" cy="0"/>
+          <a:chOff x="0" y="0"/>
+          <a:chExt cx="0" cy="0"/>
+        </a:xfrm>
+      </p:grpSpPr>
+      <p:sp>
+        <p:nvSpPr>
+          <p:cNvPr id="2" name="Title 1">
+            <a:extLst>
+              <a:ext uri="{FF2B5EF4-FFF2-40B4-BE49-F238E27FC236}">
+                <a16:creationId xmlns:a16="http://schemas.microsoft.com/office/drawing/2014/main" id="{CC1DA2A1-A135-3C6D-7146-B2F470800484}"/>
+              </a:ext>
+            </a:extLst>
+          </p:cNvPr>
+          <p:cNvSpPr>
+            <a:spLocks noGrp="1"/>
+          </p:cNvSpPr>
+          <p:nvPr>
+            <p:ph type="title"/>
+          </p:nvPr>
+        </p:nvSpPr>
+        <p:spPr/>
+        <p:txBody>
+          <a:bodyPr/>
+          <a:lstStyle/>
+          <a:p>
+            <a:r>
+              <a:rPr lang="en-US" dirty="0"/>
+              <a:t>Example: Blackjack</a:t>
+            </a:r>
+          </a:p>
+        </p:txBody>
+      </p:sp>
+      <p:sp>
+        <p:nvSpPr>
+          <p:cNvPr id="3" name="Content Placeholder 2">
+            <a:extLst>
+              <a:ext uri="{FF2B5EF4-FFF2-40B4-BE49-F238E27FC236}">
+                <a16:creationId xmlns:a16="http://schemas.microsoft.com/office/drawing/2014/main" id="{99A4CC76-C7FB-3367-A168-1BDB2619AC7E}"/>
+              </a:ext>
+            </a:extLst>
+          </p:cNvPr>
+          <p:cNvSpPr>
+            <a:spLocks noGrp="1"/>
+          </p:cNvSpPr>
+          <p:nvPr>
+            <p:ph sz="half" idx="1"/>
+          </p:nvPr>
+        </p:nvSpPr>
+        <p:spPr/>
+        <p:txBody>
+          <a:bodyPr/>
+          <a:lstStyle/>
+          <a:p>
+            <a:r>
+              <a:rPr lang="en-US" dirty="0"/>
+              <a:t>Policy hit unless 20 or 21</a:t>
+            </a:r>
+          </a:p>
+          <a:p>
+            <a:r>
+              <a:rPr lang="en-US" dirty="0"/>
+              <a:t>Questions</a:t>
+            </a:r>
+          </a:p>
+          <a:p>
+            <a:pPr lvl="1"/>
+            <a:r>
+              <a:rPr lang="en-US" dirty="0"/>
+              <a:t>Why does value jump towards the end of the chart?</a:t>
+            </a:r>
+          </a:p>
+          <a:p>
+            <a:pPr lvl="1"/>
+            <a:r>
+              <a:rPr lang="en-US" dirty="0"/>
+              <a:t>Why does it drop towards the left?</a:t>
+            </a:r>
+          </a:p>
+          <a:p>
+            <a:pPr lvl="1"/>
+            <a:endParaRPr lang="en-US" dirty="0"/>
+          </a:p>
+        </p:txBody>
+      </p:sp>
+      <p:pic>
+        <p:nvPicPr>
+          <p:cNvPr id="7" name="Content Placeholder 6">
+            <a:extLst>
+              <a:ext uri="{FF2B5EF4-FFF2-40B4-BE49-F238E27FC236}">
+                <a16:creationId xmlns:a16="http://schemas.microsoft.com/office/drawing/2014/main" id="{463B3C3B-B931-5E0A-2945-E3CC96D2C6DD}"/>
+              </a:ext>
+            </a:extLst>
+          </p:cNvPr>
+          <p:cNvPicPr>
+            <a:picLocks noGrp="1" noChangeAspect="1"/>
+          </p:cNvPicPr>
+          <p:nvPr>
+            <p:ph sz="half" idx="2"/>
+          </p:nvPr>
+        </p:nvPicPr>
+        <p:blipFill>
+          <a:blip r:embed="rId2"/>
+          <a:stretch>
+            <a:fillRect/>
+          </a:stretch>
+        </p:blipFill>
+        <p:spPr>
+          <a:xfrm>
+            <a:off x="6172200" y="2280398"/>
+            <a:ext cx="5181600" cy="3441792"/>
+          </a:xfrm>
+          <a:prstGeom prst="rect">
+            <a:avLst/>
+          </a:prstGeom>
+        </p:spPr>
+      </p:pic>
+      <p:sp>
+        <p:nvSpPr>
+          <p:cNvPr id="5" name="Footer Placeholder 4">
+            <a:extLst>
+              <a:ext uri="{FF2B5EF4-FFF2-40B4-BE49-F238E27FC236}">
+                <a16:creationId xmlns:a16="http://schemas.microsoft.com/office/drawing/2014/main" id="{16D4D525-48DC-349E-7B35-64F801635E92}"/>
+              </a:ext>
+            </a:extLst>
+          </p:cNvPr>
+          <p:cNvSpPr>
+            <a:spLocks noGrp="1"/>
+          </p:cNvSpPr>
+          <p:nvPr>
+            <p:ph type="ftr" sz="quarter" idx="11"/>
+          </p:nvPr>
+        </p:nvSpPr>
+        <p:spPr/>
+        <p:txBody>
+          <a:bodyPr/>
+          <a:lstStyle/>
+          <a:p>
+            <a:r>
+              <a:rPr lang="en-US"/>
+              <a:t>Davood Wadi</a:t>
+            </a:r>
+          </a:p>
+        </p:txBody>
+      </p:sp>
+      <p:sp>
+        <p:nvSpPr>
+          <p:cNvPr id="6" name="Slide Number Placeholder 5">
+            <a:extLst>
+              <a:ext uri="{FF2B5EF4-FFF2-40B4-BE49-F238E27FC236}">
+                <a16:creationId xmlns:a16="http://schemas.microsoft.com/office/drawing/2014/main" id="{67AA2DEA-C66E-8919-0061-29D1B58673E5}"/>
+              </a:ext>
+            </a:extLst>
+          </p:cNvPr>
+          <p:cNvSpPr>
+            <a:spLocks noGrp="1"/>
+          </p:cNvSpPr>
+          <p:nvPr>
+            <p:ph type="sldNum" sz="quarter" idx="12"/>
+          </p:nvPr>
+        </p:nvSpPr>
+        <p:spPr/>
+        <p:txBody>
+          <a:bodyPr/>
+          <a:lstStyle/>
+          <a:p>
+            <a:fld id="{3675ED69-EEF9-2244-A839-9AD338E45078}" type="slidenum">
+              <a:rPr lang="en-US" smtClean="0"/>
+              <a:t>25</a:t>
+            </a:fld>
+            <a:endParaRPr lang="en-US"/>
+          </a:p>
+        </p:txBody>
+      </p:sp>
+    </p:spTree>
+    <p:extLst>
+      <p:ext uri="{BB962C8B-B14F-4D97-AF65-F5344CB8AC3E}">
+        <p14:creationId xmlns:p14="http://schemas.microsoft.com/office/powerpoint/2010/main" val="3764276325"/>
+      </p:ext>
+    </p:extLst>
+  </p:cSld>
+  <p:clrMapOvr>
+    <a:masterClrMapping/>
+  </p:clrMapOvr>
+</p:sld>
+</file>
+
+<file path=ppt/slides/slide26.xml><?xml version="1.0" encoding="utf-8"?>
+<p:sld xmlns:a="http://schemas.openxmlformats.org/drawingml/2006/main" xmlns:r="http://schemas.openxmlformats.org/officeDocument/2006/relationships" xmlns:p="http://schemas.openxmlformats.org/presentationml/2006/main">
+  <p:cSld>
+    <p:spTree>
+      <p:nvGrpSpPr>
+        <p:cNvPr id="1" name=""/>
+        <p:cNvGrpSpPr/>
+        <p:nvPr/>
+      </p:nvGrpSpPr>
+      <p:grpSpPr>
+        <a:xfrm>
+          <a:off x="0" y="0"/>
+          <a:ext cx="0" cy="0"/>
+          <a:chOff x="0" y="0"/>
+          <a:chExt cx="0" cy="0"/>
+        </a:xfrm>
+      </p:grpSpPr>
+      <p:sp>
+        <p:nvSpPr>
+          <p:cNvPr id="7" name="Title 6">
+            <a:extLst>
+              <a:ext uri="{FF2B5EF4-FFF2-40B4-BE49-F238E27FC236}">
+                <a16:creationId xmlns:a16="http://schemas.microsoft.com/office/drawing/2014/main" id="{EBB17ADA-928E-BCA9-F4B8-51279C383819}"/>
+              </a:ext>
+            </a:extLst>
+          </p:cNvPr>
+          <p:cNvSpPr>
+            <a:spLocks noGrp="1"/>
+          </p:cNvSpPr>
+          <p:nvPr>
+            <p:ph type="title"/>
+          </p:nvPr>
+        </p:nvSpPr>
+        <p:spPr/>
+        <p:txBody>
+          <a:bodyPr/>
+          <a:lstStyle/>
+          <a:p>
+            <a:r>
+              <a:rPr lang="en-US" dirty="0"/>
+              <a:t>Temporal-Difference Learning</a:t>
+            </a:r>
+          </a:p>
+        </p:txBody>
+      </p:sp>
+      <p:sp>
+        <p:nvSpPr>
+          <p:cNvPr id="8" name="Content Placeholder 7">
+            <a:extLst>
+              <a:ext uri="{FF2B5EF4-FFF2-40B4-BE49-F238E27FC236}">
+                <a16:creationId xmlns:a16="http://schemas.microsoft.com/office/drawing/2014/main" id="{4A3D08B8-DAB5-8E1E-5A92-14FE51AD7FB5}"/>
+              </a:ext>
+            </a:extLst>
+          </p:cNvPr>
+          <p:cNvSpPr>
+            <a:spLocks noGrp="1"/>
+          </p:cNvSpPr>
+          <p:nvPr>
+            <p:ph idx="1"/>
+          </p:nvPr>
+        </p:nvSpPr>
+        <p:spPr/>
+        <p:txBody>
+          <a:bodyPr/>
+          <a:lstStyle/>
+          <a:p>
+            <a:r>
+              <a:rPr lang="en-US" dirty="0"/>
+              <a:t>One of the most central ideas to RL</a:t>
+            </a:r>
+          </a:p>
+          <a:p>
+            <a:r>
+              <a:rPr lang="en-US" dirty="0"/>
+              <a:t>Combination of MC and DP</a:t>
+            </a:r>
+          </a:p>
+          <a:p>
+            <a:pPr lvl="1"/>
+            <a:r>
+              <a:rPr lang="en-US" dirty="0"/>
+              <a:t>Like MC: learn from interactions (no P or R function)</a:t>
+            </a:r>
+          </a:p>
+          <a:p>
+            <a:pPr lvl="1"/>
+            <a:r>
+              <a:rPr lang="en-US" dirty="0"/>
+              <a:t>Like DP: update values based on estimates (~V(S’))</a:t>
+            </a:r>
+          </a:p>
+        </p:txBody>
+      </p:sp>
+      <p:sp>
+        <p:nvSpPr>
+          <p:cNvPr id="5" name="Footer Placeholder 4">
+            <a:extLst>
+              <a:ext uri="{FF2B5EF4-FFF2-40B4-BE49-F238E27FC236}">
+                <a16:creationId xmlns:a16="http://schemas.microsoft.com/office/drawing/2014/main" id="{96E06689-3D3F-42D5-DA7E-370F04B18BE8}"/>
+              </a:ext>
+            </a:extLst>
+          </p:cNvPr>
+          <p:cNvSpPr>
+            <a:spLocks noGrp="1"/>
+          </p:cNvSpPr>
+          <p:nvPr>
+            <p:ph type="ftr" sz="quarter" idx="11"/>
+          </p:nvPr>
+        </p:nvSpPr>
+        <p:spPr/>
+        <p:txBody>
+          <a:bodyPr/>
+          <a:lstStyle/>
+          <a:p>
+            <a:r>
+              <a:rPr lang="en-US"/>
+              <a:t>Davood Wadi</a:t>
+            </a:r>
+          </a:p>
+        </p:txBody>
+      </p:sp>
+      <p:sp>
+        <p:nvSpPr>
+          <p:cNvPr id="6" name="Slide Number Placeholder 5">
+            <a:extLst>
+              <a:ext uri="{FF2B5EF4-FFF2-40B4-BE49-F238E27FC236}">
+                <a16:creationId xmlns:a16="http://schemas.microsoft.com/office/drawing/2014/main" id="{C8E7CFD4-0B81-28E7-F268-34C15106D6CA}"/>
+              </a:ext>
+            </a:extLst>
+          </p:cNvPr>
+          <p:cNvSpPr>
+            <a:spLocks noGrp="1"/>
+          </p:cNvSpPr>
+          <p:nvPr>
+            <p:ph type="sldNum" sz="quarter" idx="12"/>
+          </p:nvPr>
+        </p:nvSpPr>
+        <p:spPr/>
+        <p:txBody>
+          <a:bodyPr/>
+          <a:lstStyle/>
+          <a:p>
+            <a:fld id="{3675ED69-EEF9-2244-A839-9AD338E45078}" type="slidenum">
+              <a:rPr lang="en-US" smtClean="0"/>
+              <a:t>26</a:t>
+            </a:fld>
+            <a:endParaRPr lang="en-US"/>
+          </a:p>
+        </p:txBody>
+      </p:sp>
+    </p:spTree>
+    <p:extLst>
+      <p:ext uri="{BB962C8B-B14F-4D97-AF65-F5344CB8AC3E}">
+        <p14:creationId xmlns:p14="http://schemas.microsoft.com/office/powerpoint/2010/main" val="4089480053"/>
+      </p:ext>
+    </p:extLst>
+  </p:cSld>
+  <p:clrMapOvr>
+    <a:masterClrMapping/>
+  </p:clrMapOvr>
+</p:sld>
+</file>
+
+<file path=ppt/slides/slide27.xml><?xml version="1.0" encoding="utf-8"?>
+<p:sld xmlns:a="http://schemas.openxmlformats.org/drawingml/2006/main" xmlns:r="http://schemas.openxmlformats.org/officeDocument/2006/relationships" xmlns:p="http://schemas.openxmlformats.org/presentationml/2006/main">
+  <p:cSld>
+    <p:spTree>
+      <p:nvGrpSpPr>
+        <p:cNvPr id="1" name=""/>
+        <p:cNvGrpSpPr/>
+        <p:nvPr/>
+      </p:nvGrpSpPr>
+      <p:grpSpPr>
+        <a:xfrm>
+          <a:off x="0" y="0"/>
+          <a:ext cx="0" cy="0"/>
+          <a:chOff x="0" y="0"/>
+          <a:chExt cx="0" cy="0"/>
+        </a:xfrm>
+      </p:grpSpPr>
+      <p:sp>
+        <p:nvSpPr>
+          <p:cNvPr id="2" name="Title 1">
+            <a:extLst>
+              <a:ext uri="{FF2B5EF4-FFF2-40B4-BE49-F238E27FC236}">
+                <a16:creationId xmlns:a16="http://schemas.microsoft.com/office/drawing/2014/main" id="{A3E6DABA-4EE0-3D3F-C893-BBC3D0E5CDF5}"/>
+              </a:ext>
+            </a:extLst>
+          </p:cNvPr>
+          <p:cNvSpPr>
+            <a:spLocks noGrp="1"/>
+          </p:cNvSpPr>
+          <p:nvPr>
+            <p:ph type="title"/>
+          </p:nvPr>
+        </p:nvSpPr>
+        <p:spPr/>
+        <p:txBody>
+          <a:bodyPr/>
+          <a:lstStyle/>
+          <a:p>
+            <a:r>
+              <a:rPr lang="en-US" dirty="0"/>
+              <a:t>TD vs. MC</a:t>
+            </a:r>
+          </a:p>
+        </p:txBody>
+      </p:sp>
+      <p:sp>
+        <p:nvSpPr>
+          <p:cNvPr id="3" name="Content Placeholder 2">
+            <a:extLst>
+              <a:ext uri="{FF2B5EF4-FFF2-40B4-BE49-F238E27FC236}">
+                <a16:creationId xmlns:a16="http://schemas.microsoft.com/office/drawing/2014/main" id="{FEBC708F-6D8A-4331-3C07-99A1054A6F53}"/>
+              </a:ext>
+            </a:extLst>
+          </p:cNvPr>
+          <p:cNvSpPr>
+            <a:spLocks noGrp="1"/>
+          </p:cNvSpPr>
+          <p:nvPr>
+            <p:ph sz="half" idx="1"/>
+          </p:nvPr>
+        </p:nvSpPr>
+        <p:spPr/>
+        <p:txBody>
+          <a:bodyPr/>
+          <a:lstStyle/>
+          <a:p>
+            <a:r>
+              <a:rPr lang="en-US" dirty="0"/>
+              <a:t>MC wait until R is known</a:t>
+            </a:r>
+          </a:p>
+          <a:p>
+            <a:r>
+              <a:rPr lang="en-US" dirty="0"/>
+              <a:t>Only episodic tasks</a:t>
+            </a:r>
+          </a:p>
+          <a:p>
+            <a:endParaRPr lang="en-US" dirty="0"/>
+          </a:p>
+          <a:p>
+            <a:endParaRPr lang="en-US" dirty="0"/>
+          </a:p>
+        </p:txBody>
+      </p:sp>
+      <p:sp>
+        <p:nvSpPr>
+          <p:cNvPr id="6" name="Content Placeholder 5">
+            <a:extLst>
+              <a:ext uri="{FF2B5EF4-FFF2-40B4-BE49-F238E27FC236}">
+                <a16:creationId xmlns:a16="http://schemas.microsoft.com/office/drawing/2014/main" id="{AD838E2E-2FFC-6A20-C82A-C8761AF98044}"/>
+              </a:ext>
+            </a:extLst>
+          </p:cNvPr>
+          <p:cNvSpPr>
+            <a:spLocks noGrp="1"/>
+          </p:cNvSpPr>
+          <p:nvPr>
+            <p:ph sz="half" idx="2"/>
+          </p:nvPr>
+        </p:nvSpPr>
+        <p:spPr/>
+        <p:txBody>
+          <a:bodyPr/>
+          <a:lstStyle/>
+          <a:p>
+            <a:r>
+              <a:rPr lang="en-US" dirty="0"/>
+              <a:t>TD update V(S) based on estimated (S’)</a:t>
+            </a:r>
+          </a:p>
+          <a:p>
+            <a:r>
+              <a:rPr lang="en-US" dirty="0"/>
+              <a:t>Online learning</a:t>
+            </a:r>
+          </a:p>
+        </p:txBody>
+      </p:sp>
+      <p:sp>
+        <p:nvSpPr>
+          <p:cNvPr id="4" name="Footer Placeholder 3">
+            <a:extLst>
+              <a:ext uri="{FF2B5EF4-FFF2-40B4-BE49-F238E27FC236}">
+                <a16:creationId xmlns:a16="http://schemas.microsoft.com/office/drawing/2014/main" id="{FFA93B66-3AFB-A914-DB00-16214800D31D}"/>
+              </a:ext>
+            </a:extLst>
+          </p:cNvPr>
+          <p:cNvSpPr>
+            <a:spLocks noGrp="1"/>
+          </p:cNvSpPr>
+          <p:nvPr>
+            <p:ph type="ftr" sz="quarter" idx="11"/>
+          </p:nvPr>
+        </p:nvSpPr>
+        <p:spPr/>
+        <p:txBody>
+          <a:bodyPr/>
+          <a:lstStyle/>
+          <a:p>
+            <a:r>
+              <a:rPr lang="en-US"/>
+              <a:t>Davood Wadi</a:t>
+            </a:r>
+          </a:p>
+        </p:txBody>
+      </p:sp>
+      <p:sp>
+        <p:nvSpPr>
+          <p:cNvPr id="5" name="Slide Number Placeholder 4">
+            <a:extLst>
+              <a:ext uri="{FF2B5EF4-FFF2-40B4-BE49-F238E27FC236}">
+                <a16:creationId xmlns:a16="http://schemas.microsoft.com/office/drawing/2014/main" id="{2EB04426-7D5A-135B-C4C2-08321364522A}"/>
+              </a:ext>
+            </a:extLst>
+          </p:cNvPr>
+          <p:cNvSpPr>
+            <a:spLocks noGrp="1"/>
+          </p:cNvSpPr>
+          <p:nvPr>
+            <p:ph type="sldNum" sz="quarter" idx="12"/>
+          </p:nvPr>
+        </p:nvSpPr>
+        <p:spPr/>
+        <p:txBody>
+          <a:bodyPr/>
+          <a:lstStyle/>
+          <a:p>
+            <a:fld id="{3675ED69-EEF9-2244-A839-9AD338E45078}" type="slidenum">
+              <a:rPr lang="en-US" smtClean="0"/>
+              <a:t>27</a:t>
+            </a:fld>
+            <a:endParaRPr lang="en-US"/>
+          </a:p>
+        </p:txBody>
+      </p:sp>
+    </p:spTree>
+    <p:extLst>
+      <p:ext uri="{BB962C8B-B14F-4D97-AF65-F5344CB8AC3E}">
+        <p14:creationId xmlns:p14="http://schemas.microsoft.com/office/powerpoint/2010/main" val="2073692478"/>
+      </p:ext>
+    </p:extLst>
+  </p:cSld>
+  <p:clrMapOvr>
+    <a:masterClrMapping/>
+  </p:clrMapOvr>
+</p:sld>
+</file>
+
+<file path=ppt/slides/slide28.xml><?xml version="1.0" encoding="utf-8"?>
+<p:sld xmlns:a="http://schemas.openxmlformats.org/drawingml/2006/main" xmlns:r="http://schemas.openxmlformats.org/officeDocument/2006/relationships" xmlns:p="http://schemas.openxmlformats.org/presentationml/2006/main">
+  <p:cSld>
+    <p:spTree>
+      <p:nvGrpSpPr>
+        <p:cNvPr id="1" name=""/>
+        <p:cNvGrpSpPr/>
+        <p:nvPr/>
+      </p:nvGrpSpPr>
+      <p:grpSpPr>
+        <a:xfrm>
+          <a:off x="0" y="0"/>
+          <a:ext cx="0" cy="0"/>
+          <a:chOff x="0" y="0"/>
+          <a:chExt cx="0" cy="0"/>
+        </a:xfrm>
+      </p:grpSpPr>
+      <p:sp>
+        <p:nvSpPr>
+          <p:cNvPr id="2" name="Title 1">
+            <a:extLst>
+              <a:ext uri="{FF2B5EF4-FFF2-40B4-BE49-F238E27FC236}">
+                <a16:creationId xmlns:a16="http://schemas.microsoft.com/office/drawing/2014/main" id="{AEC500C1-4635-12CE-7AC9-4E10FAC03A1B}"/>
+              </a:ext>
+            </a:extLst>
+          </p:cNvPr>
+          <p:cNvSpPr>
+            <a:spLocks noGrp="1"/>
+          </p:cNvSpPr>
+          <p:nvPr>
+            <p:ph type="title"/>
+          </p:nvPr>
+        </p:nvSpPr>
+        <p:spPr/>
+        <p:txBody>
+          <a:bodyPr/>
+          <a:lstStyle/>
+          <a:p>
+            <a:r>
+              <a:rPr lang="en-US" dirty="0"/>
+              <a:t>MC As TD </a:t>
+            </a:r>
+          </a:p>
+        </p:txBody>
+      </p:sp>
+      <p:pic>
+        <p:nvPicPr>
+          <p:cNvPr id="8" name="Content Placeholder 7">
+            <a:extLst>
+              <a:ext uri="{FF2B5EF4-FFF2-40B4-BE49-F238E27FC236}">
+                <a16:creationId xmlns:a16="http://schemas.microsoft.com/office/drawing/2014/main" id="{3AD1835F-EC19-D02E-0C4B-B00CF7E96F09}"/>
+              </a:ext>
+            </a:extLst>
+          </p:cNvPr>
+          <p:cNvPicPr>
+            <a:picLocks noGrp="1" noChangeAspect="1"/>
+          </p:cNvPicPr>
+          <p:nvPr>
+            <p:ph idx="1"/>
+          </p:nvPr>
+        </p:nvPicPr>
+        <p:blipFill>
+          <a:blip r:embed="rId2"/>
+          <a:stretch>
+            <a:fillRect/>
+          </a:stretch>
+        </p:blipFill>
+        <p:spPr>
+          <a:xfrm>
+            <a:off x="4006850" y="3658394"/>
+            <a:ext cx="4178300" cy="685800"/>
+          </a:xfrm>
+          <a:prstGeom prst="rect">
+            <a:avLst/>
+          </a:prstGeom>
+        </p:spPr>
+      </p:pic>
+      <p:sp>
+        <p:nvSpPr>
+          <p:cNvPr id="5" name="Footer Placeholder 4">
+            <a:extLst>
+              <a:ext uri="{FF2B5EF4-FFF2-40B4-BE49-F238E27FC236}">
+                <a16:creationId xmlns:a16="http://schemas.microsoft.com/office/drawing/2014/main" id="{81499BDE-10D4-1BD9-4F7E-FE5AD7F67AD5}"/>
+              </a:ext>
+            </a:extLst>
+          </p:cNvPr>
+          <p:cNvSpPr>
+            <a:spLocks noGrp="1"/>
+          </p:cNvSpPr>
+          <p:nvPr>
+            <p:ph type="ftr" sz="quarter" idx="11"/>
+          </p:nvPr>
+        </p:nvSpPr>
+        <p:spPr/>
+        <p:txBody>
+          <a:bodyPr/>
+          <a:lstStyle/>
+          <a:p>
+            <a:r>
+              <a:rPr lang="en-US"/>
+              <a:t>Davood Wadi</a:t>
+            </a:r>
+          </a:p>
+        </p:txBody>
+      </p:sp>
+      <p:sp>
+        <p:nvSpPr>
+          <p:cNvPr id="6" name="Slide Number Placeholder 5">
+            <a:extLst>
+              <a:ext uri="{FF2B5EF4-FFF2-40B4-BE49-F238E27FC236}">
+                <a16:creationId xmlns:a16="http://schemas.microsoft.com/office/drawing/2014/main" id="{85551D6F-F627-0B35-EC1E-C0F68C1E17E2}"/>
+              </a:ext>
+            </a:extLst>
+          </p:cNvPr>
+          <p:cNvSpPr>
+            <a:spLocks noGrp="1"/>
+          </p:cNvSpPr>
+          <p:nvPr>
+            <p:ph type="sldNum" sz="quarter" idx="12"/>
+          </p:nvPr>
+        </p:nvSpPr>
+        <p:spPr/>
+        <p:txBody>
+          <a:bodyPr/>
+          <a:lstStyle/>
+          <a:p>
+            <a:fld id="{3675ED69-EEF9-2244-A839-9AD338E45078}" type="slidenum">
+              <a:rPr lang="en-US" smtClean="0"/>
+              <a:t>28</a:t>
+            </a:fld>
+            <a:endParaRPr lang="en-US"/>
+          </a:p>
+        </p:txBody>
+      </p:sp>
+    </p:spTree>
+    <p:extLst>
+      <p:ext uri="{BB962C8B-B14F-4D97-AF65-F5344CB8AC3E}">
+        <p14:creationId xmlns:p14="http://schemas.microsoft.com/office/powerpoint/2010/main" val="3642045320"/>
+      </p:ext>
+    </p:extLst>
+  </p:cSld>
+  <p:clrMapOvr>
+    <a:masterClrMapping/>
+  </p:clrMapOvr>
+</p:sld>
+</file>
+
+<file path=ppt/slides/slide29.xml><?xml version="1.0" encoding="utf-8"?>
+<p:sld xmlns:a="http://schemas.openxmlformats.org/drawingml/2006/main" xmlns:r="http://schemas.openxmlformats.org/officeDocument/2006/relationships" xmlns:p="http://schemas.openxmlformats.org/presentationml/2006/main">
+  <p:cSld>
+    <p:spTree>
+      <p:nvGrpSpPr>
+        <p:cNvPr id="1" name=""/>
+        <p:cNvGrpSpPr/>
+        <p:nvPr/>
+      </p:nvGrpSpPr>
+      <p:grpSpPr>
+        <a:xfrm>
+          <a:off x="0" y="0"/>
+          <a:ext cx="0" cy="0"/>
+          <a:chOff x="0" y="0"/>
+          <a:chExt cx="0" cy="0"/>
+        </a:xfrm>
+      </p:grpSpPr>
+      <p:sp>
+        <p:nvSpPr>
+          <p:cNvPr id="2" name="Title 1">
+            <a:extLst>
+              <a:ext uri="{FF2B5EF4-FFF2-40B4-BE49-F238E27FC236}">
+                <a16:creationId xmlns:a16="http://schemas.microsoft.com/office/drawing/2014/main" id="{A10CA9C8-0B91-6E4F-AB29-852D4EF47433}"/>
+              </a:ext>
+            </a:extLst>
+          </p:cNvPr>
+          <p:cNvSpPr>
+            <a:spLocks noGrp="1"/>
+          </p:cNvSpPr>
+          <p:nvPr>
+            <p:ph type="title"/>
+          </p:nvPr>
+        </p:nvSpPr>
+        <p:spPr/>
+        <p:txBody>
+          <a:bodyPr/>
+          <a:lstStyle/>
+          <a:p>
+            <a:r>
+              <a:rPr lang="en-US" dirty="0"/>
+              <a:t>Simple TD (one-step TD)</a:t>
+            </a:r>
+          </a:p>
+        </p:txBody>
+      </p:sp>
+      <p:pic>
+        <p:nvPicPr>
+          <p:cNvPr id="6" name="Content Placeholder 5">
+            <a:extLst>
+              <a:ext uri="{FF2B5EF4-FFF2-40B4-BE49-F238E27FC236}">
+                <a16:creationId xmlns:a16="http://schemas.microsoft.com/office/drawing/2014/main" id="{D8500B06-413B-B0F3-BA7C-3C30C57B316D}"/>
+              </a:ext>
+            </a:extLst>
+          </p:cNvPr>
+          <p:cNvPicPr>
+            <a:picLocks noGrp="1" noChangeAspect="1"/>
+          </p:cNvPicPr>
+          <p:nvPr>
+            <p:ph idx="1"/>
+          </p:nvPr>
+        </p:nvPicPr>
+        <p:blipFill>
+          <a:blip r:embed="rId2"/>
+          <a:stretch>
+            <a:fillRect/>
+          </a:stretch>
+        </p:blipFill>
+        <p:spPr>
+          <a:xfrm>
+            <a:off x="3086100" y="3671094"/>
+            <a:ext cx="6019800" cy="660400"/>
+          </a:xfrm>
+          <a:prstGeom prst="rect">
+            <a:avLst/>
+          </a:prstGeom>
+        </p:spPr>
+      </p:pic>
+      <p:sp>
+        <p:nvSpPr>
+          <p:cNvPr id="4" name="Footer Placeholder 3">
+            <a:extLst>
+              <a:ext uri="{FF2B5EF4-FFF2-40B4-BE49-F238E27FC236}">
+                <a16:creationId xmlns:a16="http://schemas.microsoft.com/office/drawing/2014/main" id="{1193443F-6DFB-BD02-EDDB-79DC708F96D2}"/>
+              </a:ext>
+            </a:extLst>
+          </p:cNvPr>
+          <p:cNvSpPr>
+            <a:spLocks noGrp="1"/>
+          </p:cNvSpPr>
+          <p:nvPr>
+            <p:ph type="ftr" sz="quarter" idx="11"/>
+          </p:nvPr>
+        </p:nvSpPr>
+        <p:spPr/>
+        <p:txBody>
+          <a:bodyPr/>
+          <a:lstStyle/>
+          <a:p>
+            <a:r>
+              <a:rPr lang="en-US"/>
+              <a:t>Davood Wadi</a:t>
+            </a:r>
+          </a:p>
+        </p:txBody>
+      </p:sp>
+      <p:sp>
+        <p:nvSpPr>
+          <p:cNvPr id="5" name="Slide Number Placeholder 4">
+            <a:extLst>
+              <a:ext uri="{FF2B5EF4-FFF2-40B4-BE49-F238E27FC236}">
+                <a16:creationId xmlns:a16="http://schemas.microsoft.com/office/drawing/2014/main" id="{03285628-4320-B617-BDB0-4433630298AD}"/>
+              </a:ext>
+            </a:extLst>
+          </p:cNvPr>
+          <p:cNvSpPr>
+            <a:spLocks noGrp="1"/>
+          </p:cNvSpPr>
+          <p:nvPr>
+            <p:ph type="sldNum" sz="quarter" idx="12"/>
+          </p:nvPr>
+        </p:nvSpPr>
+        <p:spPr/>
+        <p:txBody>
+          <a:bodyPr/>
+          <a:lstStyle/>
+          <a:p>
+            <a:fld id="{3675ED69-EEF9-2244-A839-9AD338E45078}" type="slidenum">
+              <a:rPr lang="en-US" smtClean="0"/>
+              <a:t>29</a:t>
+            </a:fld>
+            <a:endParaRPr lang="en-US"/>
+          </a:p>
+        </p:txBody>
+      </p:sp>
+    </p:spTree>
+    <p:extLst>
+      <p:ext uri="{BB962C8B-B14F-4D97-AF65-F5344CB8AC3E}">
+        <p14:creationId xmlns:p14="http://schemas.microsoft.com/office/powerpoint/2010/main" val="843614474"/>
       </p:ext>
     </p:extLst>
   </p:cSld>
@@ -5608,6 +9462,481 @@
 </p:sld>
 </file>
 
+<file path=ppt/slides/slide30.xml><?xml version="1.0" encoding="utf-8"?>
+<p:sld xmlns:a="http://schemas.openxmlformats.org/drawingml/2006/main" xmlns:r="http://schemas.openxmlformats.org/officeDocument/2006/relationships" xmlns:p="http://schemas.openxmlformats.org/presentationml/2006/main">
+  <p:cSld>
+    <p:spTree>
+      <p:nvGrpSpPr>
+        <p:cNvPr id="1" name=""/>
+        <p:cNvGrpSpPr/>
+        <p:nvPr/>
+      </p:nvGrpSpPr>
+      <p:grpSpPr>
+        <a:xfrm>
+          <a:off x="0" y="0"/>
+          <a:ext cx="0" cy="0"/>
+          <a:chOff x="0" y="0"/>
+          <a:chExt cx="0" cy="0"/>
+        </a:xfrm>
+      </p:grpSpPr>
+      <p:sp>
+        <p:nvSpPr>
+          <p:cNvPr id="2" name="Title 1">
+            <a:extLst>
+              <a:ext uri="{FF2B5EF4-FFF2-40B4-BE49-F238E27FC236}">
+                <a16:creationId xmlns:a16="http://schemas.microsoft.com/office/drawing/2014/main" id="{8B58DBE4-8864-E9D1-DB34-8FBBD3FE942F}"/>
+              </a:ext>
+            </a:extLst>
+          </p:cNvPr>
+          <p:cNvSpPr>
+            <a:spLocks noGrp="1"/>
+          </p:cNvSpPr>
+          <p:nvPr>
+            <p:ph type="title"/>
+          </p:nvPr>
+        </p:nvSpPr>
+        <p:spPr/>
+        <p:txBody>
+          <a:bodyPr/>
+          <a:lstStyle/>
+          <a:p>
+            <a:r>
+              <a:rPr lang="en-US" dirty="0"/>
+              <a:t>TD</a:t>
+            </a:r>
+          </a:p>
+        </p:txBody>
+      </p:sp>
+      <p:sp>
+        <p:nvSpPr>
+          <p:cNvPr id="3" name="Content Placeholder 2">
+            <a:extLst>
+              <a:ext uri="{FF2B5EF4-FFF2-40B4-BE49-F238E27FC236}">
+                <a16:creationId xmlns:a16="http://schemas.microsoft.com/office/drawing/2014/main" id="{C94218E0-5463-76EA-7D06-6F2A64286C63}"/>
+              </a:ext>
+            </a:extLst>
+          </p:cNvPr>
+          <p:cNvSpPr>
+            <a:spLocks noGrp="1"/>
+          </p:cNvSpPr>
+          <p:nvPr>
+            <p:ph idx="1"/>
+          </p:nvPr>
+        </p:nvSpPr>
+        <p:spPr/>
+        <p:txBody>
+          <a:bodyPr/>
+          <a:lstStyle/>
+          <a:p>
+            <a:r>
+              <a:rPr lang="en-US" dirty="0"/>
+              <a:t>Updates V based on estimates of V</a:t>
+            </a:r>
+          </a:p>
+          <a:p>
+            <a:r>
+              <a:rPr lang="en-US" dirty="0"/>
+              <a:t>Bootstrapping method</a:t>
+            </a:r>
+          </a:p>
+        </p:txBody>
+      </p:sp>
+      <p:sp>
+        <p:nvSpPr>
+          <p:cNvPr id="4" name="Footer Placeholder 3">
+            <a:extLst>
+              <a:ext uri="{FF2B5EF4-FFF2-40B4-BE49-F238E27FC236}">
+                <a16:creationId xmlns:a16="http://schemas.microsoft.com/office/drawing/2014/main" id="{69AD4DDA-339B-2D25-93C3-7204CA993B52}"/>
+              </a:ext>
+            </a:extLst>
+          </p:cNvPr>
+          <p:cNvSpPr>
+            <a:spLocks noGrp="1"/>
+          </p:cNvSpPr>
+          <p:nvPr>
+            <p:ph type="ftr" sz="quarter" idx="11"/>
+          </p:nvPr>
+        </p:nvSpPr>
+        <p:spPr/>
+        <p:txBody>
+          <a:bodyPr/>
+          <a:lstStyle/>
+          <a:p>
+            <a:r>
+              <a:rPr lang="en-US"/>
+              <a:t>Davood Wadi</a:t>
+            </a:r>
+          </a:p>
+        </p:txBody>
+      </p:sp>
+      <p:sp>
+        <p:nvSpPr>
+          <p:cNvPr id="5" name="Slide Number Placeholder 4">
+            <a:extLst>
+              <a:ext uri="{FF2B5EF4-FFF2-40B4-BE49-F238E27FC236}">
+                <a16:creationId xmlns:a16="http://schemas.microsoft.com/office/drawing/2014/main" id="{B6E0A11F-D885-7CBF-2A11-97E11BE5A1EF}"/>
+              </a:ext>
+            </a:extLst>
+          </p:cNvPr>
+          <p:cNvSpPr>
+            <a:spLocks noGrp="1"/>
+          </p:cNvSpPr>
+          <p:nvPr>
+            <p:ph type="sldNum" sz="quarter" idx="12"/>
+          </p:nvPr>
+        </p:nvSpPr>
+        <p:spPr/>
+        <p:txBody>
+          <a:bodyPr/>
+          <a:lstStyle/>
+          <a:p>
+            <a:fld id="{3675ED69-EEF9-2244-A839-9AD338E45078}" type="slidenum">
+              <a:rPr lang="en-US" smtClean="0"/>
+              <a:t>30</a:t>
+            </a:fld>
+            <a:endParaRPr lang="en-US"/>
+          </a:p>
+        </p:txBody>
+      </p:sp>
+    </p:spTree>
+    <p:extLst>
+      <p:ext uri="{BB962C8B-B14F-4D97-AF65-F5344CB8AC3E}">
+        <p14:creationId xmlns:p14="http://schemas.microsoft.com/office/powerpoint/2010/main" val="1897209351"/>
+      </p:ext>
+    </p:extLst>
+  </p:cSld>
+  <p:clrMapOvr>
+    <a:masterClrMapping/>
+  </p:clrMapOvr>
+</p:sld>
+</file>
+
+<file path=ppt/slides/slide31.xml><?xml version="1.0" encoding="utf-8"?>
+<p:sld xmlns:a="http://schemas.openxmlformats.org/drawingml/2006/main" xmlns:r="http://schemas.openxmlformats.org/officeDocument/2006/relationships" xmlns:p="http://schemas.openxmlformats.org/presentationml/2006/main">
+  <p:cSld>
+    <p:spTree>
+      <p:nvGrpSpPr>
+        <p:cNvPr id="1" name=""/>
+        <p:cNvGrpSpPr/>
+        <p:nvPr/>
+      </p:nvGrpSpPr>
+      <p:grpSpPr>
+        <a:xfrm>
+          <a:off x="0" y="0"/>
+          <a:ext cx="0" cy="0"/>
+          <a:chOff x="0" y="0"/>
+          <a:chExt cx="0" cy="0"/>
+        </a:xfrm>
+      </p:grpSpPr>
+      <p:sp>
+        <p:nvSpPr>
+          <p:cNvPr id="2" name="Title 1">
+            <a:extLst>
+              <a:ext uri="{FF2B5EF4-FFF2-40B4-BE49-F238E27FC236}">
+                <a16:creationId xmlns:a16="http://schemas.microsoft.com/office/drawing/2014/main" id="{229981C6-893B-E3F1-381C-1D8E80FE890D}"/>
+              </a:ext>
+            </a:extLst>
+          </p:cNvPr>
+          <p:cNvSpPr>
+            <a:spLocks noGrp="1"/>
+          </p:cNvSpPr>
+          <p:nvPr>
+            <p:ph type="title"/>
+          </p:nvPr>
+        </p:nvSpPr>
+        <p:spPr/>
+        <p:txBody>
+          <a:bodyPr/>
+          <a:lstStyle/>
+          <a:p>
+            <a:r>
+              <a:rPr lang="en-US" dirty="0"/>
+              <a:t>SARSA</a:t>
+            </a:r>
+          </a:p>
+        </p:txBody>
+      </p:sp>
+      <p:pic>
+        <p:nvPicPr>
+          <p:cNvPr id="6" name="Content Placeholder 5">
+            <a:extLst>
+              <a:ext uri="{FF2B5EF4-FFF2-40B4-BE49-F238E27FC236}">
+                <a16:creationId xmlns:a16="http://schemas.microsoft.com/office/drawing/2014/main" id="{8505E9CA-9859-A66C-EBA8-42DBDDFC8E66}"/>
+              </a:ext>
+            </a:extLst>
+          </p:cNvPr>
+          <p:cNvPicPr>
+            <a:picLocks noGrp="1" noChangeAspect="1"/>
+          </p:cNvPicPr>
+          <p:nvPr>
+            <p:ph sz="half" idx="1"/>
+          </p:nvPr>
+        </p:nvPicPr>
+        <p:blipFill>
+          <a:blip r:embed="rId2"/>
+          <a:stretch>
+            <a:fillRect/>
+          </a:stretch>
+        </p:blipFill>
+        <p:spPr>
+          <a:xfrm>
+            <a:off x="838200" y="3731914"/>
+            <a:ext cx="5181600" cy="538759"/>
+          </a:xfrm>
+          <a:prstGeom prst="rect">
+            <a:avLst/>
+          </a:prstGeom>
+        </p:spPr>
+      </p:pic>
+      <p:pic>
+        <p:nvPicPr>
+          <p:cNvPr id="8" name="Content Placeholder 7">
+            <a:extLst>
+              <a:ext uri="{FF2B5EF4-FFF2-40B4-BE49-F238E27FC236}">
+                <a16:creationId xmlns:a16="http://schemas.microsoft.com/office/drawing/2014/main" id="{46FE49D0-1722-89E2-3E17-30E61FCD9C40}"/>
+              </a:ext>
+            </a:extLst>
+          </p:cNvPr>
+          <p:cNvPicPr>
+            <a:picLocks noGrp="1" noChangeAspect="1"/>
+          </p:cNvPicPr>
+          <p:nvPr>
+            <p:ph sz="half" idx="2"/>
+          </p:nvPr>
+        </p:nvPicPr>
+        <p:blipFill>
+          <a:blip r:embed="rId3"/>
+          <a:stretch>
+            <a:fillRect/>
+          </a:stretch>
+        </p:blipFill>
+        <p:spPr>
+          <a:xfrm>
+            <a:off x="6172200" y="3770115"/>
+            <a:ext cx="5181600" cy="462358"/>
+          </a:xfrm>
+          <a:prstGeom prst="rect">
+            <a:avLst/>
+          </a:prstGeom>
+        </p:spPr>
+      </p:pic>
+      <p:sp>
+        <p:nvSpPr>
+          <p:cNvPr id="4" name="Footer Placeholder 3">
+            <a:extLst>
+              <a:ext uri="{FF2B5EF4-FFF2-40B4-BE49-F238E27FC236}">
+                <a16:creationId xmlns:a16="http://schemas.microsoft.com/office/drawing/2014/main" id="{66A96DBA-96DC-0ED4-0542-F478458F4520}"/>
+              </a:ext>
+            </a:extLst>
+          </p:cNvPr>
+          <p:cNvSpPr>
+            <a:spLocks noGrp="1"/>
+          </p:cNvSpPr>
+          <p:nvPr>
+            <p:ph type="ftr" sz="quarter" idx="11"/>
+          </p:nvPr>
+        </p:nvSpPr>
+        <p:spPr/>
+        <p:txBody>
+          <a:bodyPr/>
+          <a:lstStyle/>
+          <a:p>
+            <a:r>
+              <a:rPr lang="en-US"/>
+              <a:t>Davood Wadi</a:t>
+            </a:r>
+          </a:p>
+        </p:txBody>
+      </p:sp>
+      <p:sp>
+        <p:nvSpPr>
+          <p:cNvPr id="5" name="Slide Number Placeholder 4">
+            <a:extLst>
+              <a:ext uri="{FF2B5EF4-FFF2-40B4-BE49-F238E27FC236}">
+                <a16:creationId xmlns:a16="http://schemas.microsoft.com/office/drawing/2014/main" id="{FB7F6CD1-0A54-AA73-BFAC-A4BB86EAF955}"/>
+              </a:ext>
+            </a:extLst>
+          </p:cNvPr>
+          <p:cNvSpPr>
+            <a:spLocks noGrp="1"/>
+          </p:cNvSpPr>
+          <p:nvPr>
+            <p:ph type="sldNum" sz="quarter" idx="12"/>
+          </p:nvPr>
+        </p:nvSpPr>
+        <p:spPr/>
+        <p:txBody>
+          <a:bodyPr/>
+          <a:lstStyle/>
+          <a:p>
+            <a:fld id="{3675ED69-EEF9-2244-A839-9AD338E45078}" type="slidenum">
+              <a:rPr lang="en-US" smtClean="0"/>
+              <a:t>31</a:t>
+            </a:fld>
+            <a:endParaRPr lang="en-US"/>
+          </a:p>
+        </p:txBody>
+      </p:sp>
+    </p:spTree>
+    <p:extLst>
+      <p:ext uri="{BB962C8B-B14F-4D97-AF65-F5344CB8AC3E}">
+        <p14:creationId xmlns:p14="http://schemas.microsoft.com/office/powerpoint/2010/main" val="1937412564"/>
+      </p:ext>
+    </p:extLst>
+  </p:cSld>
+  <p:clrMapOvr>
+    <a:masterClrMapping/>
+  </p:clrMapOvr>
+</p:sld>
+</file>
+
+<file path=ppt/slides/slide32.xml><?xml version="1.0" encoding="utf-8"?>
+<p:sld xmlns:a="http://schemas.openxmlformats.org/drawingml/2006/main" xmlns:r="http://schemas.openxmlformats.org/officeDocument/2006/relationships" xmlns:p="http://schemas.openxmlformats.org/presentationml/2006/main">
+  <p:cSld>
+    <p:spTree>
+      <p:nvGrpSpPr>
+        <p:cNvPr id="1" name=""/>
+        <p:cNvGrpSpPr/>
+        <p:nvPr/>
+      </p:nvGrpSpPr>
+      <p:grpSpPr>
+        <a:xfrm>
+          <a:off x="0" y="0"/>
+          <a:ext cx="0" cy="0"/>
+          <a:chOff x="0" y="0"/>
+          <a:chExt cx="0" cy="0"/>
+        </a:xfrm>
+      </p:grpSpPr>
+      <p:sp>
+        <p:nvSpPr>
+          <p:cNvPr id="2" name="Title 1">
+            <a:extLst>
+              <a:ext uri="{FF2B5EF4-FFF2-40B4-BE49-F238E27FC236}">
+                <a16:creationId xmlns:a16="http://schemas.microsoft.com/office/drawing/2014/main" id="{DB74F3F8-9835-F52E-F122-F5BDCF7F8F1E}"/>
+              </a:ext>
+            </a:extLst>
+          </p:cNvPr>
+          <p:cNvSpPr>
+            <a:spLocks noGrp="1"/>
+          </p:cNvSpPr>
+          <p:nvPr>
+            <p:ph type="title"/>
+          </p:nvPr>
+        </p:nvSpPr>
+        <p:spPr/>
+        <p:txBody>
+          <a:bodyPr/>
+          <a:lstStyle/>
+          <a:p>
+            <a:r>
+              <a:rPr lang="en-US" dirty="0"/>
+              <a:t>SARSA</a:t>
+            </a:r>
+          </a:p>
+        </p:txBody>
+      </p:sp>
+      <p:pic>
+        <p:nvPicPr>
+          <p:cNvPr id="8" name="Content Placeholder 7">
+            <a:extLst>
+              <a:ext uri="{FF2B5EF4-FFF2-40B4-BE49-F238E27FC236}">
+                <a16:creationId xmlns:a16="http://schemas.microsoft.com/office/drawing/2014/main" id="{71AA943A-F444-2981-9948-C382060414AE}"/>
+              </a:ext>
+            </a:extLst>
+          </p:cNvPr>
+          <p:cNvPicPr>
+            <a:picLocks noGrp="1" noChangeAspect="1"/>
+          </p:cNvPicPr>
+          <p:nvPr>
+            <p:ph idx="1"/>
+          </p:nvPr>
+        </p:nvPicPr>
+        <p:blipFill>
+          <a:blip r:embed="rId2"/>
+          <a:stretch>
+            <a:fillRect/>
+          </a:stretch>
+        </p:blipFill>
+        <p:spPr>
+          <a:xfrm>
+            <a:off x="1182283" y="1825625"/>
+            <a:ext cx="9827434" cy="4351338"/>
+          </a:xfrm>
+          <a:prstGeom prst="rect">
+            <a:avLst/>
+          </a:prstGeom>
+        </p:spPr>
+      </p:pic>
+      <p:sp>
+        <p:nvSpPr>
+          <p:cNvPr id="5" name="Footer Placeholder 4">
+            <a:extLst>
+              <a:ext uri="{FF2B5EF4-FFF2-40B4-BE49-F238E27FC236}">
+                <a16:creationId xmlns:a16="http://schemas.microsoft.com/office/drawing/2014/main" id="{3841F0AA-14E8-B122-7D1B-B5879BCE7AB9}"/>
+              </a:ext>
+            </a:extLst>
+          </p:cNvPr>
+          <p:cNvSpPr>
+            <a:spLocks noGrp="1"/>
+          </p:cNvSpPr>
+          <p:nvPr>
+            <p:ph type="ftr" sz="quarter" idx="11"/>
+          </p:nvPr>
+        </p:nvSpPr>
+        <p:spPr/>
+        <p:txBody>
+          <a:bodyPr/>
+          <a:lstStyle/>
+          <a:p>
+            <a:r>
+              <a:rPr lang="en-US"/>
+              <a:t>Davood Wadi</a:t>
+            </a:r>
+          </a:p>
+        </p:txBody>
+      </p:sp>
+      <p:sp>
+        <p:nvSpPr>
+          <p:cNvPr id="6" name="Slide Number Placeholder 5">
+            <a:extLst>
+              <a:ext uri="{FF2B5EF4-FFF2-40B4-BE49-F238E27FC236}">
+                <a16:creationId xmlns:a16="http://schemas.microsoft.com/office/drawing/2014/main" id="{8C8E3326-D505-C288-216D-9D9AC33D8885}"/>
+              </a:ext>
+            </a:extLst>
+          </p:cNvPr>
+          <p:cNvSpPr>
+            <a:spLocks noGrp="1"/>
+          </p:cNvSpPr>
+          <p:nvPr>
+            <p:ph type="sldNum" sz="quarter" idx="12"/>
+          </p:nvPr>
+        </p:nvSpPr>
+        <p:spPr/>
+        <p:txBody>
+          <a:bodyPr/>
+          <a:lstStyle/>
+          <a:p>
+            <a:fld id="{3675ED69-EEF9-2244-A839-9AD338E45078}" type="slidenum">
+              <a:rPr lang="en-US" smtClean="0"/>
+              <a:t>32</a:t>
+            </a:fld>
+            <a:endParaRPr lang="en-US"/>
+          </a:p>
+        </p:txBody>
+      </p:sp>
+    </p:spTree>
+    <p:extLst>
+      <p:ext uri="{BB962C8B-B14F-4D97-AF65-F5344CB8AC3E}">
+        <p14:creationId xmlns:p14="http://schemas.microsoft.com/office/powerpoint/2010/main" val="2285922154"/>
+      </p:ext>
+    </p:extLst>
+  </p:cSld>
+  <p:clrMapOvr>
+    <a:masterClrMapping/>
+  </p:clrMapOvr>
+</p:sld>
+</file>
+
 <file path=ppt/slides/slide4.xml><?xml version="1.0" encoding="utf-8"?>
 <p:sld xmlns:a="http://schemas.openxmlformats.org/drawingml/2006/main" xmlns:r="http://schemas.openxmlformats.org/officeDocument/2006/relationships" xmlns:p="http://schemas.openxmlformats.org/presentationml/2006/main">
   <p:cSld>
@@ -5771,8 +10100,13 @@
             <a:pPr lvl="1"/>
             <a:r>
               <a:rPr lang="en-US" dirty="0"/>
-              <a:t>Function from states (and actions) to their value</a:t>
-            </a:r>
+              <a:t>Function from </a:t>
+            </a:r>
+            <a:r>
+              <a:rPr lang="en-US"/>
+              <a:t>states to their value (and actions)</a:t>
+            </a:r>
+            <a:endParaRPr lang="en-US" dirty="0"/>
           </a:p>
           <a:p>
             <a:pPr lvl="1"/>
@@ -6488,7 +10822,7 @@
           <p:cNvPr id="2" name="Title 1">
             <a:extLst>
               <a:ext uri="{FF2B5EF4-FFF2-40B4-BE49-F238E27FC236}">
-                <a16:creationId xmlns:a16="http://schemas.microsoft.com/office/drawing/2014/main" id="{B73FDBBE-09CD-8F62-9479-FB0C6E5AE161}"/>
+                <a16:creationId xmlns:a16="http://schemas.microsoft.com/office/drawing/2014/main" id="{588AF3C6-4F5F-58BB-8683-C56B2B071972}"/>
               </a:ext>
             </a:extLst>
           </p:cNvPr>
@@ -6506,7 +10840,7 @@
           <a:p>
             <a:r>
               <a:rPr lang="en-US" dirty="0"/>
-              <a:t>Agent and Environment</a:t>
+              <a:t>Rewards</a:t>
             </a:r>
           </a:p>
         </p:txBody>
@@ -6516,7 +10850,7 @@
           <p:cNvPr id="3" name="Content Placeholder 2">
             <a:extLst>
               <a:ext uri="{FF2B5EF4-FFF2-40B4-BE49-F238E27FC236}">
-                <a16:creationId xmlns:a16="http://schemas.microsoft.com/office/drawing/2014/main" id="{8D1F0C1C-F9D4-AC48-6407-8A69DF30B189}"/>
+                <a16:creationId xmlns:a16="http://schemas.microsoft.com/office/drawing/2014/main" id="{217ADC0A-FC44-407C-1254-017231FBCDE6}"/>
               </a:ext>
             </a:extLst>
           </p:cNvPr>
@@ -6534,39 +10868,33 @@
           <a:p>
             <a:r>
               <a:rPr lang="en-US" dirty="0"/>
-              <a:t>Human</a:t>
-            </a:r>
-          </a:p>
-          <a:p>
-            <a:pPr lvl="1"/>
-            <a:r>
-              <a:rPr lang="en-US" dirty="0"/>
-              <a:t>Body</a:t>
-            </a:r>
-          </a:p>
-          <a:p>
-            <a:pPr lvl="1"/>
-            <a:r>
-              <a:rPr lang="en-US" dirty="0"/>
-              <a:t>Digestive system</a:t>
-            </a:r>
-          </a:p>
-          <a:p>
-            <a:r>
-              <a:rPr lang="en-US" dirty="0"/>
-              <a:t>Agent</a:t>
-            </a:r>
-          </a:p>
-          <a:p>
-            <a:pPr lvl="1"/>
-            <a:r>
-              <a:rPr lang="en-US" dirty="0"/>
-              <a:t>Direct control</a:t>
-            </a:r>
-          </a:p>
-          <a:p>
-            <a:pPr lvl="1"/>
-            <a:endParaRPr lang="en-US" dirty="0"/>
+              <a:t>Present the ultimate goal, not subgoals</a:t>
+            </a:r>
+          </a:p>
+          <a:p>
+            <a:r>
+              <a:rPr lang="en-US" dirty="0"/>
+              <a:t>NOT prior information about the task</a:t>
+            </a:r>
+          </a:p>
+          <a:p>
+            <a:r>
+              <a:rPr lang="en-US" dirty="0"/>
+              <a:t>Show the agent what to achieve, not how to achieve it.</a:t>
+            </a:r>
+          </a:p>
+          <a:p>
+            <a:r>
+              <a:rPr lang="en-US" dirty="0"/>
+              <a:t>Example: </a:t>
+            </a:r>
+            <a:br>
+              <a:rPr lang="en-US" dirty="0"/>
+            </a:br>
+            <a:r>
+              <a:rPr lang="en-US" dirty="0"/>
+              <a:t>	Chess</a:t>
+            </a:r>
           </a:p>
         </p:txBody>
       </p:sp>
@@ -6575,7 +10903,7 @@
           <p:cNvPr id="4" name="Footer Placeholder 3">
             <a:extLst>
               <a:ext uri="{FF2B5EF4-FFF2-40B4-BE49-F238E27FC236}">
-                <a16:creationId xmlns:a16="http://schemas.microsoft.com/office/drawing/2014/main" id="{3D7EFE17-AE85-2EC0-0C50-175963780260}"/>
+                <a16:creationId xmlns:a16="http://schemas.microsoft.com/office/drawing/2014/main" id="{7428D9DE-71CD-EB35-9DBC-C14877719598}"/>
               </a:ext>
             </a:extLst>
           </p:cNvPr>
@@ -6603,7 +10931,7 @@
           <p:cNvPr id="5" name="Slide Number Placeholder 4">
             <a:extLst>
               <a:ext uri="{FF2B5EF4-FFF2-40B4-BE49-F238E27FC236}">
-                <a16:creationId xmlns:a16="http://schemas.microsoft.com/office/drawing/2014/main" id="{F9786185-1616-BA10-46CD-B2FE1B544957}"/>
+                <a16:creationId xmlns:a16="http://schemas.microsoft.com/office/drawing/2014/main" id="{01F2372D-1D68-62A2-43BD-134150BBEA8A}"/>
               </a:ext>
             </a:extLst>
           </p:cNvPr>
@@ -6630,7 +10958,7 @@
     </p:spTree>
     <p:extLst>
       <p:ext uri="{BB962C8B-B14F-4D97-AF65-F5344CB8AC3E}">
-        <p14:creationId xmlns:p14="http://schemas.microsoft.com/office/powerpoint/2010/main" val="1683541208"/>
+        <p14:creationId xmlns:p14="http://schemas.microsoft.com/office/powerpoint/2010/main" val="36255990"/>
       </p:ext>
     </p:extLst>
   </p:cSld>
@@ -6662,7 +10990,7 @@
           <p:cNvPr id="2" name="Title 1">
             <a:extLst>
               <a:ext uri="{FF2B5EF4-FFF2-40B4-BE49-F238E27FC236}">
-                <a16:creationId xmlns:a16="http://schemas.microsoft.com/office/drawing/2014/main" id="{16ED25C1-58FD-9FAC-FB8B-2201295BFFEA}"/>
+                <a16:creationId xmlns:a16="http://schemas.microsoft.com/office/drawing/2014/main" id="{B73FDBBE-09CD-8F62-9479-FB0C6E5AE161}"/>
               </a:ext>
             </a:extLst>
           </p:cNvPr>
@@ -6680,7 +11008,7 @@
           <a:p>
             <a:r>
               <a:rPr lang="en-US" dirty="0"/>
-              <a:t>MDP example</a:t>
+              <a:t>Agent and Environment</a:t>
             </a:r>
           </a:p>
         </p:txBody>
@@ -6690,7 +11018,7 @@
           <p:cNvPr id="3" name="Content Placeholder 2">
             <a:extLst>
               <a:ext uri="{FF2B5EF4-FFF2-40B4-BE49-F238E27FC236}">
-                <a16:creationId xmlns:a16="http://schemas.microsoft.com/office/drawing/2014/main" id="{561CF887-221C-F604-4515-1A717E23FC62}"/>
+                <a16:creationId xmlns:a16="http://schemas.microsoft.com/office/drawing/2014/main" id="{8D1F0C1C-F9D4-AC48-6407-8A69DF30B189}"/>
               </a:ext>
             </a:extLst>
           </p:cNvPr>
@@ -6708,32 +11036,40 @@
           <a:p>
             <a:r>
               <a:rPr lang="en-US" dirty="0"/>
-              <a:t>Chess</a:t>
-            </a:r>
-          </a:p>
-          <a:p>
-            <a:r>
-              <a:rPr lang="en-US" dirty="0"/>
-              <a:t>Playing video games</a:t>
-            </a:r>
-          </a:p>
-          <a:p>
-            <a:r>
-              <a:rPr lang="en-US" dirty="0"/>
-              <a:t>Trading </a:t>
-            </a:r>
-            <a:r>
-              <a:rPr lang="en-US"/>
-              <a:t>financial instruments</a:t>
-            </a:r>
+              <a:t>Human</a:t>
+            </a:r>
+          </a:p>
+          <a:p>
+            <a:pPr lvl="1"/>
+            <a:r>
+              <a:rPr lang="en-US" dirty="0"/>
+              <a:t>Body</a:t>
+            </a:r>
+          </a:p>
+          <a:p>
+            <a:pPr lvl="1"/>
+            <a:r>
+              <a:rPr lang="en-US" dirty="0"/>
+              <a:t>Digestive system</a:t>
+            </a:r>
+          </a:p>
+          <a:p>
+            <a:r>
+              <a:rPr lang="en-US" dirty="0"/>
+              <a:t>Agent</a:t>
+            </a:r>
+          </a:p>
+          <a:p>
+            <a:pPr lvl="1"/>
+            <a:r>
+              <a:rPr lang="en-US" dirty="0"/>
+              <a:t>Direct control</a:t>
+            </a:r>
+          </a:p>
+          <a:p>
+            <a:pPr lvl="1"/>
             <a:endParaRPr lang="en-US" dirty="0"/>
           </a:p>
-          <a:p>
-            <a:r>
-              <a:rPr lang="en-US" dirty="0"/>
-              <a:t>Driving</a:t>
-            </a:r>
-          </a:p>
         </p:txBody>
       </p:sp>
       <p:sp>
@@ -6741,7 +11077,7 @@
           <p:cNvPr id="4" name="Footer Placeholder 3">
             <a:extLst>
               <a:ext uri="{FF2B5EF4-FFF2-40B4-BE49-F238E27FC236}">
-                <a16:creationId xmlns:a16="http://schemas.microsoft.com/office/drawing/2014/main" id="{F281C627-52A0-1F38-B948-C53BAD9D9E42}"/>
+                <a16:creationId xmlns:a16="http://schemas.microsoft.com/office/drawing/2014/main" id="{3D7EFE17-AE85-2EC0-0C50-175963780260}"/>
               </a:ext>
             </a:extLst>
           </p:cNvPr>
@@ -6769,7 +11105,7 @@
           <p:cNvPr id="5" name="Slide Number Placeholder 4">
             <a:extLst>
               <a:ext uri="{FF2B5EF4-FFF2-40B4-BE49-F238E27FC236}">
-                <a16:creationId xmlns:a16="http://schemas.microsoft.com/office/drawing/2014/main" id="{D2DBC3A1-0BA1-074E-C31D-AF9C0445E7AB}"/>
+                <a16:creationId xmlns:a16="http://schemas.microsoft.com/office/drawing/2014/main" id="{F9786185-1616-BA10-46CD-B2FE1B544957}"/>
               </a:ext>
             </a:extLst>
           </p:cNvPr>
@@ -6796,7 +11132,7 @@
     </p:spTree>
     <p:extLst>
       <p:ext uri="{BB962C8B-B14F-4D97-AF65-F5344CB8AC3E}">
-        <p14:creationId xmlns:p14="http://schemas.microsoft.com/office/powerpoint/2010/main" val="948981311"/>
+        <p14:creationId xmlns:p14="http://schemas.microsoft.com/office/powerpoint/2010/main" val="1683541208"/>
       </p:ext>
     </p:extLst>
   </p:cSld>

</xml_diff>